<commit_message>
code almost done, still need bifurcation diagram
</commit_message>
<xml_diff>
--- a/Poster.pptx
+++ b/Poster.pptx
@@ -16422,31 +16422,11 @@
   <p:cSld>
     <p:bg>
       <p:bgPr>
-        <a:gradFill flip="none" rotWithShape="1">
-          <a:gsLst>
-            <a:gs pos="86000">
-              <a:srgbClr val="A0A0A0"/>
-            </a:gs>
-            <a:gs pos="64000">
-              <a:srgbClr val="BBBBBB"/>
-            </a:gs>
-            <a:gs pos="0">
-              <a:schemeClr val="accent1">
-                <a:lumMod val="40000"/>
-                <a:lumOff val="60000"/>
-              </a:schemeClr>
-            </a:gs>
-            <a:gs pos="100000">
-              <a:schemeClr val="accent1">
-                <a:lumMod val="60000"/>
-              </a:schemeClr>
-            </a:gs>
-          </a:gsLst>
-          <a:path path="circle">
-            <a:fillToRect l="50000" t="50000" r="50000" b="50000"/>
-          </a:path>
-          <a:tileRect/>
-        </a:gradFill>
+        <a:solidFill>
+          <a:schemeClr val="accent3">
+            <a:alpha val="75000"/>
+          </a:schemeClr>
+        </a:solidFill>
         <a:effectLst/>
       </p:bgPr>
     </p:bg>
@@ -16492,7 +16472,7 @@
         </p:blipFill>
         <p:spPr>
           <a:xfrm>
-            <a:off x="0" y="22276453"/>
+            <a:off x="67223" y="23462710"/>
             <a:ext cx="7449189" cy="5187426"/>
           </a:xfrm>
           <a:prstGeom prst="rect">
@@ -16528,7 +16508,7 @@
         </p:blipFill>
         <p:spPr>
           <a:xfrm>
-            <a:off x="0" y="17874267"/>
+            <a:off x="0" y="19049076"/>
             <a:ext cx="7386587" cy="5143832"/>
           </a:xfrm>
           <a:prstGeom prst="rect">
@@ -16557,7 +16537,7 @@
             <p:spPr>
               <a:xfrm>
                 <a:off x="459674" y="6378481"/>
-                <a:ext cx="10056813" cy="1687491"/>
+                <a:ext cx="10056813" cy="1646582"/>
               </a:xfrm>
             </p:spPr>
             <p:txBody>
@@ -16570,7 +16550,11 @@
                   </a:lnSpc>
                 </a:pPr>
                 <a:r>
-                  <a:rPr lang="en-US" dirty="0"/>
+                  <a:rPr lang="en-US" dirty="0">
+                    <a:solidFill>
+                      <a:schemeClr val="tx1"/>
+                    </a:solidFill>
+                  </a:rPr>
                   <a:t>The equation of motion for the pendulum</a:t>
                 </a:r>
               </a:p>
@@ -16591,6 +16575,9 @@
                           <m:chr m:val="̈"/>
                           <m:ctrlPr>
                             <a:rPr lang="en-US" i="1" smtClean="0">
+                              <a:solidFill>
+                                <a:schemeClr val="tx1"/>
+                              </a:solidFill>
                               <a:latin typeface="Cambria Math" panose="02040503050406030204" pitchFamily="18" charset="0"/>
                             </a:rPr>
                           </m:ctrlPr>
@@ -16598,6 +16585,9 @@
                         <m:e>
                           <m:r>
                             <a:rPr lang="en-US" b="0" i="1" smtClean="0">
+                              <a:solidFill>
+                                <a:schemeClr val="tx1"/>
+                              </a:solidFill>
                               <a:latin typeface="Cambria Math" panose="02040503050406030204" pitchFamily="18" charset="0"/>
                             </a:rPr>
                             <m:t>𝜙</m:t>
@@ -16606,6 +16596,9 @@
                       </m:acc>
                       <m:r>
                         <a:rPr lang="en-US" b="0" i="1" smtClean="0">
+                          <a:solidFill>
+                            <a:schemeClr val="tx1"/>
+                          </a:solidFill>
                           <a:latin typeface="Cambria Math" panose="02040503050406030204" pitchFamily="18" charset="0"/>
                         </a:rPr>
                         <m:t>=−</m:t>
@@ -16614,6 +16607,9 @@
                         <m:sSubSupPr>
                           <m:ctrlPr>
                             <a:rPr lang="en-US" b="0" i="1" smtClean="0">
+                              <a:solidFill>
+                                <a:schemeClr val="tx1"/>
+                              </a:solidFill>
                               <a:latin typeface="Cambria Math" panose="02040503050406030204" pitchFamily="18" charset="0"/>
                             </a:rPr>
                           </m:ctrlPr>
@@ -16621,6 +16617,9 @@
                         <m:e>
                           <m:r>
                             <a:rPr lang="en-US" b="0" i="1" smtClean="0">
+                              <a:solidFill>
+                                <a:schemeClr val="tx1"/>
+                              </a:solidFill>
                               <a:latin typeface="Cambria Math" panose="02040503050406030204" pitchFamily="18" charset="0"/>
                             </a:rPr>
                             <m:t>𝜔</m:t>
@@ -16629,6 +16628,9 @@
                         <m:sub>
                           <m:r>
                             <a:rPr lang="en-US" b="0" i="1" smtClean="0">
+                              <a:solidFill>
+                                <a:schemeClr val="tx1"/>
+                              </a:solidFill>
                               <a:latin typeface="Cambria Math" panose="02040503050406030204" pitchFamily="18" charset="0"/>
                             </a:rPr>
                             <m:t>0</m:t>
@@ -16637,6 +16639,9 @@
                         <m:sup>
                           <m:r>
                             <a:rPr lang="en-US" b="0" i="1" smtClean="0">
+                              <a:solidFill>
+                                <a:schemeClr val="tx1"/>
+                              </a:solidFill>
                               <a:latin typeface="Cambria Math" panose="02040503050406030204" pitchFamily="18" charset="0"/>
                             </a:rPr>
                             <m:t>2</m:t>
@@ -16648,6 +16653,9 @@
                           <m:nor/>
                         </m:rPr>
                         <a:rPr lang="en-US" b="0" i="0" smtClean="0">
+                          <a:solidFill>
+                            <a:schemeClr val="tx1"/>
+                          </a:solidFill>
                           <a:latin typeface="Cambria Math" panose="02040503050406030204" pitchFamily="18" charset="0"/>
                         </a:rPr>
                         <m:t>sin</m:t>
@@ -16656,6 +16664,9 @@
                         <m:dPr>
                           <m:ctrlPr>
                             <a:rPr lang="en-US" b="0" i="1" smtClean="0">
+                              <a:solidFill>
+                                <a:schemeClr val="tx1"/>
+                              </a:solidFill>
                               <a:latin typeface="Cambria Math" panose="02040503050406030204" pitchFamily="18" charset="0"/>
                             </a:rPr>
                           </m:ctrlPr>
@@ -16663,6 +16674,9 @@
                         <m:e>
                           <m:r>
                             <a:rPr lang="en-US" b="0" i="1" smtClean="0">
+                              <a:solidFill>
+                                <a:schemeClr val="tx1"/>
+                              </a:solidFill>
                               <a:latin typeface="Cambria Math" panose="02040503050406030204" pitchFamily="18" charset="0"/>
                             </a:rPr>
                             <m:t>𝜙</m:t>
@@ -16671,6 +16685,9 @@
                       </m:d>
                       <m:r>
                         <a:rPr lang="en-US" b="0" i="1" smtClean="0">
+                          <a:solidFill>
+                            <a:schemeClr val="tx1"/>
+                          </a:solidFill>
                           <a:latin typeface="Cambria Math" panose="02040503050406030204" pitchFamily="18" charset="0"/>
                         </a:rPr>
                         <m:t> −2</m:t>
@@ -16679,6 +16696,9 @@
                         <m:sSubPr>
                           <m:ctrlPr>
                             <a:rPr lang="en-US" b="0" i="1" smtClean="0">
+                              <a:solidFill>
+                                <a:schemeClr val="tx1"/>
+                              </a:solidFill>
                               <a:latin typeface="Cambria Math" panose="02040503050406030204" pitchFamily="18" charset="0"/>
                             </a:rPr>
                           </m:ctrlPr>
@@ -16686,6 +16706,9 @@
                         <m:e>
                           <m:r>
                             <a:rPr lang="en-US" b="0" i="1" smtClean="0">
+                              <a:solidFill>
+                                <a:schemeClr val="tx1"/>
+                              </a:solidFill>
                               <a:latin typeface="Cambria Math" panose="02040503050406030204" pitchFamily="18" charset="0"/>
                             </a:rPr>
                             <m:t>𝜔</m:t>
@@ -16694,6 +16717,9 @@
                         <m:sub>
                           <m:r>
                             <a:rPr lang="en-US" b="0" i="1" smtClean="0">
+                              <a:solidFill>
+                                <a:schemeClr val="tx1"/>
+                              </a:solidFill>
                               <a:latin typeface="Cambria Math" panose="02040503050406030204" pitchFamily="18" charset="0"/>
                             </a:rPr>
                             <m:t>0</m:t>
@@ -16702,6 +16728,9 @@
                       </m:sSub>
                       <m:r>
                         <a:rPr lang="en-US" b="0" i="1" smtClean="0">
+                          <a:solidFill>
+                            <a:schemeClr val="tx1"/>
+                          </a:solidFill>
                           <a:latin typeface="Cambria Math" panose="02040503050406030204" pitchFamily="18" charset="0"/>
                         </a:rPr>
                         <m:t>𝜒</m:t>
@@ -16711,6 +16740,9 @@
                           <m:chr m:val="̇"/>
                           <m:ctrlPr>
                             <a:rPr lang="en-US" b="0" i="1" smtClean="0">
+                              <a:solidFill>
+                                <a:schemeClr val="tx1"/>
+                              </a:solidFill>
                               <a:latin typeface="Cambria Math" panose="02040503050406030204" pitchFamily="18" charset="0"/>
                             </a:rPr>
                           </m:ctrlPr>
@@ -16718,6 +16750,9 @@
                         <m:e>
                           <m:r>
                             <a:rPr lang="en-US" b="0" i="1" smtClean="0">
+                              <a:solidFill>
+                                <a:schemeClr val="tx1"/>
+                              </a:solidFill>
                               <a:latin typeface="Cambria Math" panose="02040503050406030204" pitchFamily="18" charset="0"/>
                             </a:rPr>
                             <m:t>𝜙</m:t>
@@ -16726,12 +16761,18 @@
                       </m:acc>
                       <m:r>
                         <a:rPr lang="en-US" b="0" i="1" smtClean="0">
+                          <a:solidFill>
+                            <a:schemeClr val="tx1"/>
+                          </a:solidFill>
                           <a:latin typeface="Cambria Math" panose="02040503050406030204" pitchFamily="18" charset="0"/>
                         </a:rPr>
                         <m:t>+</m:t>
                       </m:r>
                       <m:r>
                         <a:rPr lang="en-US" b="0" i="1" smtClean="0">
+                          <a:solidFill>
+                            <a:schemeClr val="tx1"/>
+                          </a:solidFill>
                           <a:latin typeface="Cambria Math" panose="02040503050406030204" pitchFamily="18" charset="0"/>
                         </a:rPr>
                         <m:t>𝜂</m:t>
@@ -16741,12 +16782,18 @@
                           <m:nor/>
                         </m:rPr>
                         <a:rPr lang="en-US" b="0" i="0" smtClean="0">
+                          <a:solidFill>
+                            <a:schemeClr val="tx1"/>
+                          </a:solidFill>
                           <a:latin typeface="Cambria Math" panose="02040503050406030204" pitchFamily="18" charset="0"/>
                         </a:rPr>
                         <m:t>cos</m:t>
                       </m:r>
                       <m:r>
                         <a:rPr lang="en-US" b="0" i="1" smtClean="0">
+                          <a:solidFill>
+                            <a:schemeClr val="tx1"/>
+                          </a:solidFill>
                           <a:latin typeface="Cambria Math" panose="02040503050406030204" pitchFamily="18" charset="0"/>
                         </a:rPr>
                         <m:t>(</m:t>
@@ -16755,6 +16802,9 @@
                         <m:sSubPr>
                           <m:ctrlPr>
                             <a:rPr lang="en-US" b="0" i="1" smtClean="0">
+                              <a:solidFill>
+                                <a:schemeClr val="tx1"/>
+                              </a:solidFill>
                               <a:latin typeface="Cambria Math" panose="02040503050406030204" pitchFamily="18" charset="0"/>
                             </a:rPr>
                           </m:ctrlPr>
@@ -16762,6 +16812,9 @@
                         <m:e>
                           <m:r>
                             <a:rPr lang="en-US" b="0" i="1" smtClean="0">
+                              <a:solidFill>
+                                <a:schemeClr val="tx1"/>
+                              </a:solidFill>
                               <a:latin typeface="Cambria Math" panose="02040503050406030204" pitchFamily="18" charset="0"/>
                             </a:rPr>
                             <m:t>𝜔</m:t>
@@ -16770,6 +16823,9 @@
                         <m:sub>
                           <m:r>
                             <a:rPr lang="en-US" b="0" i="1" smtClean="0">
+                              <a:solidFill>
+                                <a:schemeClr val="tx1"/>
+                              </a:solidFill>
                               <a:latin typeface="Cambria Math" panose="02040503050406030204" pitchFamily="18" charset="0"/>
                             </a:rPr>
                             <m:t>𝑑</m:t>
@@ -16778,24 +16834,36 @@
                       </m:sSub>
                       <m:r>
                         <a:rPr lang="en-US" b="0" i="1" smtClean="0">
+                          <a:solidFill>
+                            <a:schemeClr val="tx1"/>
+                          </a:solidFill>
                           <a:latin typeface="Cambria Math" panose="02040503050406030204" pitchFamily="18" charset="0"/>
                         </a:rPr>
                         <m:t>𝑡</m:t>
                       </m:r>
                       <m:r>
                         <a:rPr lang="en-US" b="0" i="1" smtClean="0">
+                          <a:solidFill>
+                            <a:schemeClr val="tx1"/>
+                          </a:solidFill>
                           <a:latin typeface="Cambria Math" panose="02040503050406030204" pitchFamily="18" charset="0"/>
                         </a:rPr>
                         <m:t>+</m:t>
                       </m:r>
                       <m:r>
                         <a:rPr lang="en-US" b="0" i="1" smtClean="0">
+                          <a:solidFill>
+                            <a:schemeClr val="tx1"/>
+                          </a:solidFill>
                           <a:latin typeface="Cambria Math" panose="02040503050406030204" pitchFamily="18" charset="0"/>
                         </a:rPr>
                         <m:t>𝛿</m:t>
                       </m:r>
                       <m:r>
                         <a:rPr lang="en-US" b="0" i="1" smtClean="0">
+                          <a:solidFill>
+                            <a:schemeClr val="tx1"/>
+                          </a:solidFill>
                           <a:latin typeface="Cambria Math" panose="02040503050406030204" pitchFamily="18" charset="0"/>
                         </a:rPr>
                         <m:t>)</m:t>
@@ -16803,7 +16871,11 @@
                     </m:oMath>
                   </m:oMathPara>
                 </a14:m>
-                <a:endParaRPr lang="en-US" dirty="0"/>
+                <a:endParaRPr lang="en-US" dirty="0">
+                  <a:solidFill>
+                    <a:schemeClr val="tx1"/>
+                  </a:solidFill>
+                </a:endParaRPr>
               </a:p>
             </p:txBody>
           </p:sp>
@@ -16828,7 +16900,7 @@
             <p:spPr>
               <a:xfrm>
                 <a:off x="459674" y="6378481"/>
-                <a:ext cx="10056813" cy="1687491"/>
+                <a:ext cx="10056813" cy="1646582"/>
               </a:xfrm>
               <a:blipFill>
                 <a:blip r:embed="rId5"/>
@@ -16868,13 +16940,57 @@
             <p:ph type="body" sz="quarter" idx="11"/>
           </p:nvPr>
         </p:nvSpPr>
-        <p:spPr/>
+        <p:spPr>
+          <a:xfrm>
+            <a:off x="477827" y="5577218"/>
+            <a:ext cx="10048875" cy="697106"/>
+          </a:xfrm>
+          <a:gradFill flip="none" rotWithShape="1">
+            <a:gsLst>
+              <a:gs pos="0">
+                <a:srgbClr val="FF9300">
+                  <a:tint val="66000"/>
+                  <a:satMod val="160000"/>
+                </a:srgbClr>
+              </a:gs>
+              <a:gs pos="50000">
+                <a:srgbClr val="FF9300">
+                  <a:tint val="44500"/>
+                  <a:satMod val="160000"/>
+                </a:srgbClr>
+              </a:gs>
+              <a:gs pos="100000">
+                <a:srgbClr val="FF9300">
+                  <a:tint val="23500"/>
+                  <a:satMod val="160000"/>
+                </a:srgbClr>
+              </a:gs>
+            </a:gsLst>
+            <a:path path="circle">
+              <a:fillToRect l="50000" t="50000" r="50000" b="50000"/>
+            </a:path>
+            <a:tileRect/>
+          </a:gradFill>
+          <a:ln>
+            <a:solidFill>
+              <a:schemeClr val="accent5">
+                <a:lumMod val="50000"/>
+              </a:schemeClr>
+            </a:solidFill>
+          </a:ln>
+        </p:spPr>
         <p:txBody>
           <a:bodyPr/>
           <a:lstStyle/>
           <a:p>
             <a:r>
-              <a:rPr lang="en-US" u="none" dirty="0"/>
+              <a:rPr lang="en-US" u="none" dirty="0">
+                <a:solidFill>
+                  <a:schemeClr val="tx1">
+                    <a:lumMod val="95000"/>
+                  </a:schemeClr>
+                </a:solidFill>
+              </a:rPr>
               <a:t>Introduction</a:t>
             </a:r>
           </a:p>
@@ -16901,6 +17017,42 @@
             <a:off x="477825" y="14240982"/>
             <a:ext cx="10050462" cy="697106"/>
           </a:xfrm>
+          <a:gradFill flip="none" rotWithShape="1">
+            <a:gsLst>
+              <a:gs pos="0">
+                <a:srgbClr val="FF9300">
+                  <a:tint val="66000"/>
+                  <a:satMod val="160000"/>
+                </a:srgbClr>
+              </a:gs>
+              <a:gs pos="50000">
+                <a:srgbClr val="FF9300">
+                  <a:tint val="44500"/>
+                  <a:satMod val="160000"/>
+                </a:srgbClr>
+              </a:gs>
+              <a:gs pos="100000">
+                <a:srgbClr val="FF9300">
+                  <a:tint val="23500"/>
+                  <a:satMod val="160000"/>
+                </a:srgbClr>
+              </a:gs>
+            </a:gsLst>
+            <a:path path="circle">
+              <a:fillToRect l="50000" t="50000" r="50000" b="50000"/>
+            </a:path>
+            <a:tileRect/>
+          </a:gradFill>
+          <a:ln>
+            <a:solidFill>
+              <a:schemeClr val="accent5">
+                <a:lumMod val="50000"/>
+              </a:schemeClr>
+            </a:solidFill>
+          </a:ln>
+          <a:effectLst>
+            <a:softEdge rad="12700"/>
+          </a:effectLst>
         </p:spPr>
         <p:txBody>
           <a:bodyPr/>
@@ -16934,7 +17086,7 @@
             <p:spPr>
               <a:xfrm>
                 <a:off x="11433249" y="6278842"/>
-                <a:ext cx="10038662" cy="2337797"/>
+                <a:ext cx="10038662" cy="2562731"/>
               </a:xfrm>
             </p:spPr>
             <p:txBody>
@@ -16947,7 +17099,11 @@
                   </a:lnSpc>
                 </a:pPr>
                 <a:r>
-                  <a:rPr lang="en-US" dirty="0"/>
+                  <a:rPr lang="en-US" sz="2800" dirty="0">
+                    <a:solidFill>
+                      <a:schemeClr val="tx1"/>
+                    </a:solidFill>
+                  </a:rPr>
                   <a:t>For a small initial displacement </a:t>
                 </a:r>
                 <a14:m>
@@ -16955,14 +17111,20 @@
                     <m:sSub>
                       <m:sSubPr>
                         <m:ctrlPr>
-                          <a:rPr lang="en-US" b="0" i="1" smtClean="0">
+                          <a:rPr lang="en-US" sz="2800" b="0" i="1" smtClean="0">
+                            <a:solidFill>
+                              <a:schemeClr val="tx1"/>
+                            </a:solidFill>
                             <a:latin typeface="Cambria Math" panose="02040503050406030204" pitchFamily="18" charset="0"/>
                           </a:rPr>
                         </m:ctrlPr>
                       </m:sSubPr>
                       <m:e>
                         <m:r>
-                          <a:rPr lang="en-US" b="0" i="1" smtClean="0">
+                          <a:rPr lang="en-US" sz="2800" b="0" i="1" smtClean="0">
+                            <a:solidFill>
+                              <a:schemeClr val="tx1"/>
+                            </a:solidFill>
                             <a:latin typeface="Cambria Math" panose="02040503050406030204" pitchFamily="18" charset="0"/>
                           </a:rPr>
                           <m:t>𝜙</m:t>
@@ -16970,7 +17132,10 @@
                       </m:e>
                       <m:sub>
                         <m:r>
-                          <a:rPr lang="en-US" b="0" i="1" smtClean="0">
+                          <a:rPr lang="en-US" sz="2800" b="0" i="1" smtClean="0">
+                            <a:solidFill>
+                              <a:schemeClr val="tx1"/>
+                            </a:solidFill>
                             <a:latin typeface="Cambria Math" panose="02040503050406030204" pitchFamily="18" charset="0"/>
                           </a:rPr>
                           <m:t>0</m:t>
@@ -16978,7 +17143,10 @@
                       </m:sub>
                     </m:sSub>
                     <m:r>
-                      <a:rPr lang="en-US" b="0" i="1" smtClean="0">
+                      <a:rPr lang="en-US" sz="2800" b="0" i="1" smtClean="0">
+                        <a:solidFill>
+                          <a:schemeClr val="tx1"/>
+                        </a:solidFill>
                         <a:latin typeface="Cambria Math" panose="02040503050406030204" pitchFamily="18" charset="0"/>
                       </a:rPr>
                       <m:t>=</m:t>
@@ -16986,14 +17154,20 @@
                     <m:f>
                       <m:fPr>
                         <m:ctrlPr>
-                          <a:rPr lang="en-US" b="0" i="1" smtClean="0">
+                          <a:rPr lang="en-US" sz="2800" b="0" i="1" smtClean="0">
+                            <a:solidFill>
+                              <a:schemeClr val="tx1"/>
+                            </a:solidFill>
                             <a:latin typeface="Cambria Math" panose="02040503050406030204" pitchFamily="18" charset="0"/>
                           </a:rPr>
                         </m:ctrlPr>
                       </m:fPr>
                       <m:num>
                         <m:r>
-                          <a:rPr lang="en-US" b="0" i="1" smtClean="0">
+                          <a:rPr lang="en-US" sz="2800" b="0" i="1" smtClean="0">
+                            <a:solidFill>
+                              <a:schemeClr val="tx1"/>
+                            </a:solidFill>
                             <a:latin typeface="Cambria Math" panose="02040503050406030204" pitchFamily="18" charset="0"/>
                           </a:rPr>
                           <m:t>𝜋</m:t>
@@ -17001,7 +17175,10 @@
                       </m:num>
                       <m:den>
                         <m:r>
-                          <a:rPr lang="en-US" b="0" i="1" smtClean="0">
+                          <a:rPr lang="en-US" sz="2800" b="0" i="1" smtClean="0">
+                            <a:solidFill>
+                              <a:schemeClr val="tx1"/>
+                            </a:solidFill>
                             <a:latin typeface="Cambria Math" panose="02040503050406030204" pitchFamily="18" charset="0"/>
                           </a:rPr>
                           <m:t>20</m:t>
@@ -17011,31 +17188,47 @@
                   </m:oMath>
                 </a14:m>
                 <a:r>
-                  <a:rPr lang="en-US" dirty="0"/>
+                  <a:rPr lang="en-US" sz="2800" dirty="0">
+                    <a:solidFill>
+                      <a:schemeClr val="tx1"/>
+                    </a:solidFill>
+                  </a:rPr>
                   <a:t>, the dynamics of the pendulum can be well approximated by the analytic solution </a:t>
                 </a:r>
                 <a14:m>
                   <m:oMath xmlns:m="http://schemas.openxmlformats.org/officeDocument/2006/math">
                     <m:r>
-                      <a:rPr lang="en-US" b="0" i="1" smtClean="0">
+                      <a:rPr lang="en-US" sz="2800" b="0" i="1" smtClean="0">
+                        <a:solidFill>
+                          <a:schemeClr val="tx1"/>
+                        </a:solidFill>
                         <a:latin typeface="Cambria Math" panose="02040503050406030204" pitchFamily="18" charset="0"/>
                       </a:rPr>
                       <m:t>𝜙</m:t>
                     </m:r>
                     <m:r>
-                      <a:rPr lang="en-US" b="0" i="1" smtClean="0">
+                      <a:rPr lang="en-US" sz="2800" b="0" i="1" smtClean="0">
+                        <a:solidFill>
+                          <a:schemeClr val="tx1"/>
+                        </a:solidFill>
                         <a:latin typeface="Cambria Math" panose="02040503050406030204" pitchFamily="18" charset="0"/>
                       </a:rPr>
                       <m:t>(</m:t>
                     </m:r>
                     <m:r>
-                      <a:rPr lang="en-US" b="0" i="1" smtClean="0">
+                      <a:rPr lang="en-US" sz="2800" b="0" i="1" smtClean="0">
+                        <a:solidFill>
+                          <a:schemeClr val="tx1"/>
+                        </a:solidFill>
                         <a:latin typeface="Cambria Math" panose="02040503050406030204" pitchFamily="18" charset="0"/>
                       </a:rPr>
                       <m:t>𝑡</m:t>
                     </m:r>
                     <m:r>
-                      <a:rPr lang="en-US" b="0" i="1" smtClean="0">
+                      <a:rPr lang="en-US" sz="2800" b="0" i="1" smtClean="0">
+                        <a:solidFill>
+                          <a:schemeClr val="tx1"/>
+                        </a:solidFill>
                         <a:latin typeface="Cambria Math" panose="02040503050406030204" pitchFamily="18" charset="0"/>
                       </a:rPr>
                       <m:t>)=</m:t>
@@ -17043,14 +17236,20 @@
                     <m:sSub>
                       <m:sSubPr>
                         <m:ctrlPr>
-                          <a:rPr lang="en-US" b="0" i="1" smtClean="0">
+                          <a:rPr lang="en-US" sz="2800" b="0" i="1" smtClean="0">
+                            <a:solidFill>
+                              <a:schemeClr val="tx1"/>
+                            </a:solidFill>
                             <a:latin typeface="Cambria Math" panose="02040503050406030204" pitchFamily="18" charset="0"/>
                           </a:rPr>
                         </m:ctrlPr>
                       </m:sSubPr>
                       <m:e>
                         <m:r>
-                          <a:rPr lang="en-US" b="0" i="1" smtClean="0">
+                          <a:rPr lang="en-US" sz="2800" b="0" i="1" smtClean="0">
+                            <a:solidFill>
+                              <a:schemeClr val="tx1"/>
+                            </a:solidFill>
                             <a:latin typeface="Cambria Math" panose="02040503050406030204" pitchFamily="18" charset="0"/>
                           </a:rPr>
                           <m:t>𝜙</m:t>
@@ -17058,7 +17257,10 @@
                       </m:e>
                       <m:sub>
                         <m:r>
-                          <a:rPr lang="en-US" b="0" i="1" smtClean="0">
+                          <a:rPr lang="en-US" sz="2800" b="0" i="1" smtClean="0">
+                            <a:solidFill>
+                              <a:schemeClr val="tx1"/>
+                            </a:solidFill>
                             <a:latin typeface="Cambria Math" panose="02040503050406030204" pitchFamily="18" charset="0"/>
                           </a:rPr>
                           <m:t>0</m:t>
@@ -17069,13 +17271,19 @@
                       <m:rPr>
                         <m:nor/>
                       </m:rPr>
-                      <a:rPr lang="en-US" b="0" i="0" smtClean="0">
+                      <a:rPr lang="en-US" sz="2800" b="0" i="0" smtClean="0">
+                        <a:solidFill>
+                          <a:schemeClr val="tx1"/>
+                        </a:solidFill>
                         <a:latin typeface="Cambria Math" panose="02040503050406030204" pitchFamily="18" charset="0"/>
                       </a:rPr>
                       <m:t>cos</m:t>
                     </m:r>
                     <m:r>
-                      <a:rPr lang="en-US" b="0" i="1" smtClean="0">
+                      <a:rPr lang="en-US" sz="2800" b="0" i="1" smtClean="0">
+                        <a:solidFill>
+                          <a:schemeClr val="tx1"/>
+                        </a:solidFill>
                         <a:latin typeface="Cambria Math" panose="02040503050406030204" pitchFamily="18" charset="0"/>
                       </a:rPr>
                       <m:t>(</m:t>
@@ -17083,14 +17291,20 @@
                     <m:sSub>
                       <m:sSubPr>
                         <m:ctrlPr>
-                          <a:rPr lang="en-US" b="0" i="1" smtClean="0">
+                          <a:rPr lang="en-US" sz="2800" b="0" i="1" smtClean="0">
+                            <a:solidFill>
+                              <a:schemeClr val="tx1"/>
+                            </a:solidFill>
                             <a:latin typeface="Cambria Math" panose="02040503050406030204" pitchFamily="18" charset="0"/>
                           </a:rPr>
                         </m:ctrlPr>
                       </m:sSubPr>
                       <m:e>
                         <m:r>
-                          <a:rPr lang="en-US" b="0" i="1" smtClean="0">
+                          <a:rPr lang="en-US" sz="2800" b="0" i="1" smtClean="0">
+                            <a:solidFill>
+                              <a:schemeClr val="tx1"/>
+                            </a:solidFill>
                             <a:latin typeface="Cambria Math" panose="02040503050406030204" pitchFamily="18" charset="0"/>
                           </a:rPr>
                           <m:t>𝜔</m:t>
@@ -17098,7 +17312,10 @@
                       </m:e>
                       <m:sub>
                         <m:r>
-                          <a:rPr lang="en-US" b="0" i="1" smtClean="0">
+                          <a:rPr lang="en-US" sz="2800" b="0" i="1" smtClean="0">
+                            <a:solidFill>
+                              <a:schemeClr val="tx1"/>
+                            </a:solidFill>
                             <a:latin typeface="Cambria Math" panose="02040503050406030204" pitchFamily="18" charset="0"/>
                           </a:rPr>
                           <m:t>0</m:t>
@@ -17106,13 +17323,19 @@
                       </m:sub>
                     </m:sSub>
                     <m:r>
-                      <a:rPr lang="en-US" b="0" i="1" smtClean="0">
+                      <a:rPr lang="en-US" sz="2800" b="0" i="1" smtClean="0">
+                        <a:solidFill>
+                          <a:schemeClr val="tx1"/>
+                        </a:solidFill>
                         <a:latin typeface="Cambria Math" panose="02040503050406030204" pitchFamily="18" charset="0"/>
                       </a:rPr>
                       <m:t>𝑡</m:t>
                     </m:r>
                     <m:r>
-                      <a:rPr lang="en-US" b="0" i="1" smtClean="0">
+                      <a:rPr lang="en-US" sz="2800" b="0" i="1" smtClean="0">
+                        <a:solidFill>
+                          <a:schemeClr val="tx1"/>
+                        </a:solidFill>
                         <a:latin typeface="Cambria Math" panose="02040503050406030204" pitchFamily="18" charset="0"/>
                       </a:rPr>
                       <m:t>)</m:t>
@@ -17120,22 +17343,32 @@
                   </m:oMath>
                 </a14:m>
                 <a:r>
-                  <a:rPr lang="en-US" dirty="0"/>
-                  <a:t>. For the case shown, the pendulum acquires a well defined period of </a:t>
+                  <a:rPr lang="en-US" sz="2800" dirty="0">
+                    <a:solidFill>
+                      <a:schemeClr val="tx1"/>
+                    </a:solidFill>
+                  </a:rPr>
+                  <a:t>. For the case shown, the pendulum acquires a period of </a:t>
                 </a:r>
                 <a14:m>
                   <m:oMath xmlns:m="http://schemas.openxmlformats.org/officeDocument/2006/math">
                     <m:sSub>
                       <m:sSubPr>
                         <m:ctrlPr>
-                          <a:rPr lang="en-US" b="0" i="1" smtClean="0">
+                          <a:rPr lang="en-US" sz="2800" b="0" i="1" smtClean="0">
+                            <a:solidFill>
+                              <a:schemeClr val="tx1"/>
+                            </a:solidFill>
                             <a:latin typeface="Cambria Math" panose="02040503050406030204" pitchFamily="18" charset="0"/>
                           </a:rPr>
                         </m:ctrlPr>
                       </m:sSubPr>
                       <m:e>
                         <m:r>
-                          <a:rPr lang="en-US" b="0" i="1" smtClean="0">
+                          <a:rPr lang="en-US" sz="2800" b="0" i="1" smtClean="0">
+                            <a:solidFill>
+                              <a:schemeClr val="tx1"/>
+                            </a:solidFill>
                             <a:latin typeface="Cambria Math" panose="02040503050406030204" pitchFamily="18" charset="0"/>
                           </a:rPr>
                           <m:t>𝑇</m:t>
@@ -17143,7 +17376,10 @@
                       </m:e>
                       <m:sub>
                         <m:r>
-                          <a:rPr lang="en-US" b="0" i="1" smtClean="0">
+                          <a:rPr lang="en-US" sz="2800" b="0" i="1" smtClean="0">
+                            <a:solidFill>
+                              <a:schemeClr val="tx1"/>
+                            </a:solidFill>
                             <a:latin typeface="Cambria Math" panose="02040503050406030204" pitchFamily="18" charset="0"/>
                           </a:rPr>
                           <m:t>0</m:t>
@@ -17151,7 +17387,10 @@
                       </m:sub>
                     </m:sSub>
                     <m:r>
-                      <a:rPr lang="en-US" b="0" i="1" smtClean="0">
+                      <a:rPr lang="en-US" sz="2800" b="0" i="1" smtClean="0">
+                        <a:solidFill>
+                          <a:schemeClr val="tx1"/>
+                        </a:solidFill>
                         <a:latin typeface="Cambria Math" panose="02040503050406030204" pitchFamily="18" charset="0"/>
                       </a:rPr>
                       <m:t>=</m:t>
@@ -17159,20 +17398,29 @@
                     <m:f>
                       <m:fPr>
                         <m:ctrlPr>
-                          <a:rPr lang="en-US" b="0" i="1" smtClean="0">
+                          <a:rPr lang="en-US" sz="2800" b="0" i="1" smtClean="0">
+                            <a:solidFill>
+                              <a:schemeClr val="tx1"/>
+                            </a:solidFill>
                             <a:latin typeface="Cambria Math" panose="02040503050406030204" pitchFamily="18" charset="0"/>
                           </a:rPr>
                         </m:ctrlPr>
                       </m:fPr>
                       <m:num>
                         <m:r>
-                          <a:rPr lang="en-US" b="0" i="1" smtClean="0">
+                          <a:rPr lang="en-US" sz="2800" b="0" i="1" smtClean="0">
+                            <a:solidFill>
+                              <a:schemeClr val="tx1"/>
+                            </a:solidFill>
                             <a:latin typeface="Cambria Math" panose="02040503050406030204" pitchFamily="18" charset="0"/>
                           </a:rPr>
                           <m:t>2</m:t>
                         </m:r>
                         <m:r>
-                          <a:rPr lang="en-US" b="0" i="1" smtClean="0">
+                          <a:rPr lang="en-US" sz="2800" b="0" i="1" smtClean="0">
+                            <a:solidFill>
+                              <a:schemeClr val="tx1"/>
+                            </a:solidFill>
                             <a:latin typeface="Cambria Math" panose="02040503050406030204" pitchFamily="18" charset="0"/>
                           </a:rPr>
                           <m:t>𝜋</m:t>
@@ -17182,14 +17430,20 @@
                         <m:sSub>
                           <m:sSubPr>
                             <m:ctrlPr>
-                              <a:rPr lang="en-US" b="0" i="1" smtClean="0">
+                              <a:rPr lang="en-US" sz="2800" b="0" i="1" smtClean="0">
+                                <a:solidFill>
+                                  <a:schemeClr val="tx1"/>
+                                </a:solidFill>
                                 <a:latin typeface="Cambria Math" panose="02040503050406030204" pitchFamily="18" charset="0"/>
                               </a:rPr>
                             </m:ctrlPr>
                           </m:sSubPr>
                           <m:e>
                             <m:r>
-                              <a:rPr lang="en-US" b="0" i="1" smtClean="0">
+                              <a:rPr lang="en-US" sz="2800" b="0" i="1" smtClean="0">
+                                <a:solidFill>
+                                  <a:schemeClr val="tx1"/>
+                                </a:solidFill>
                                 <a:latin typeface="Cambria Math" panose="02040503050406030204" pitchFamily="18" charset="0"/>
                               </a:rPr>
                               <m:t>𝜔</m:t>
@@ -17197,7 +17451,10 @@
                           </m:e>
                           <m:sub>
                             <m:r>
-                              <a:rPr lang="en-US" b="0" i="1" smtClean="0">
+                              <a:rPr lang="en-US" sz="2800" b="0" i="1" smtClean="0">
+                                <a:solidFill>
+                                  <a:schemeClr val="tx1"/>
+                                </a:solidFill>
                                 <a:latin typeface="Cambria Math" panose="02040503050406030204" pitchFamily="18" charset="0"/>
                               </a:rPr>
                               <m:t>0</m:t>
@@ -17207,13 +17464,19 @@
                       </m:den>
                     </m:f>
                     <m:r>
-                      <a:rPr lang="en-US" b="0" i="1" smtClean="0">
+                      <a:rPr lang="en-US" sz="2800" b="0" i="1" smtClean="0">
+                        <a:solidFill>
+                          <a:schemeClr val="tx1"/>
+                        </a:solidFill>
                         <a:latin typeface="Cambria Math" panose="02040503050406030204" pitchFamily="18" charset="0"/>
                       </a:rPr>
                       <m:t>=0.916 </m:t>
                     </m:r>
                     <m:r>
-                      <a:rPr lang="en-US" b="0" i="1" smtClean="0">
+                      <a:rPr lang="en-US" sz="2800" b="0" i="1" smtClean="0">
+                        <a:solidFill>
+                          <a:schemeClr val="tx1"/>
+                        </a:solidFill>
                         <a:latin typeface="Cambria Math" panose="02040503050406030204" pitchFamily="18" charset="0"/>
                       </a:rPr>
                       <m:t>𝑠</m:t>
@@ -17221,7 +17484,11 @@
                   </m:oMath>
                 </a14:m>
                 <a:r>
-                  <a:rPr lang="en-US" dirty="0"/>
+                  <a:rPr lang="en-US" sz="2800" dirty="0">
+                    <a:solidFill>
+                      <a:schemeClr val="tx1"/>
+                    </a:solidFill>
+                  </a:rPr>
                   <a:t>.</a:t>
                 </a:r>
               </a:p>
@@ -17248,7 +17515,7 @@
             <p:spPr>
               <a:xfrm>
                 <a:off x="11433249" y="6278842"/>
-                <a:ext cx="10038662" cy="2337797"/>
+                <a:ext cx="10038662" cy="2562731"/>
               </a:xfrm>
               <a:blipFill>
                 <a:blip r:embed="rId6"/>
@@ -17293,6 +17560,39 @@
             <a:off x="11460162" y="5623377"/>
             <a:ext cx="20974055" cy="697106"/>
           </a:xfrm>
+          <a:gradFill flip="none" rotWithShape="1">
+            <a:gsLst>
+              <a:gs pos="0">
+                <a:srgbClr val="FF9300">
+                  <a:tint val="66000"/>
+                  <a:satMod val="160000"/>
+                </a:srgbClr>
+              </a:gs>
+              <a:gs pos="50000">
+                <a:srgbClr val="FF9300">
+                  <a:tint val="44500"/>
+                  <a:satMod val="160000"/>
+                </a:srgbClr>
+              </a:gs>
+              <a:gs pos="100000">
+                <a:srgbClr val="FF9300">
+                  <a:tint val="23500"/>
+                  <a:satMod val="160000"/>
+                </a:srgbClr>
+              </a:gs>
+            </a:gsLst>
+            <a:path path="circle">
+              <a:fillToRect l="50000" t="50000" r="50000" b="50000"/>
+            </a:path>
+            <a:tileRect/>
+          </a:gradFill>
+          <a:ln>
+            <a:solidFill>
+              <a:schemeClr val="accent5">
+                <a:lumMod val="50000"/>
+              </a:schemeClr>
+            </a:solidFill>
+          </a:ln>
         </p:spPr>
         <p:txBody>
           <a:bodyPr/>
@@ -17326,6 +17626,39 @@
             <a:off x="33390292" y="5577218"/>
             <a:ext cx="10047018" cy="697106"/>
           </a:xfrm>
+          <a:gradFill flip="none" rotWithShape="1">
+            <a:gsLst>
+              <a:gs pos="0">
+                <a:srgbClr val="FF9300">
+                  <a:tint val="66000"/>
+                  <a:satMod val="160000"/>
+                </a:srgbClr>
+              </a:gs>
+              <a:gs pos="50000">
+                <a:srgbClr val="FF9300">
+                  <a:tint val="44500"/>
+                  <a:satMod val="160000"/>
+                </a:srgbClr>
+              </a:gs>
+              <a:gs pos="100000">
+                <a:srgbClr val="FF9300">
+                  <a:tint val="23500"/>
+                  <a:satMod val="160000"/>
+                </a:srgbClr>
+              </a:gs>
+            </a:gsLst>
+            <a:path path="circle">
+              <a:fillToRect l="50000" t="50000" r="50000" b="50000"/>
+            </a:path>
+            <a:tileRect/>
+          </a:gradFill>
+          <a:ln>
+            <a:solidFill>
+              <a:schemeClr val="accent4">
+                <a:lumMod val="50000"/>
+              </a:schemeClr>
+            </a:solidFill>
+          </a:ln>
         </p:spPr>
         <p:txBody>
           <a:bodyPr/>
@@ -17379,12 +17712,46 @@
             <p:ph type="body" sz="quarter" idx="27"/>
           </p:nvPr>
         </p:nvSpPr>
-        <p:spPr/>
+        <p:spPr>
+          <a:gradFill flip="none" rotWithShape="1">
+            <a:gsLst>
+              <a:gs pos="0">
+                <a:srgbClr val="FF9300">
+                  <a:tint val="66000"/>
+                  <a:satMod val="160000"/>
+                </a:srgbClr>
+              </a:gs>
+              <a:gs pos="50000">
+                <a:srgbClr val="FF9300">
+                  <a:tint val="44500"/>
+                  <a:satMod val="160000"/>
+                </a:srgbClr>
+              </a:gs>
+              <a:gs pos="100000">
+                <a:srgbClr val="FF9300">
+                  <a:tint val="23500"/>
+                  <a:satMod val="160000"/>
+                </a:srgbClr>
+              </a:gs>
+            </a:gsLst>
+            <a:path path="circle">
+              <a:fillToRect l="50000" t="50000" r="50000" b="50000"/>
+            </a:path>
+            <a:tileRect/>
+          </a:gradFill>
+          <a:ln>
+            <a:solidFill>
+              <a:schemeClr val="accent4">
+                <a:lumMod val="50000"/>
+              </a:schemeClr>
+            </a:solidFill>
+          </a:ln>
+        </p:spPr>
         <p:txBody>
           <a:bodyPr/>
           <a:lstStyle/>
           <a:p>
-            <a:endParaRPr lang="en-US"/>
+            <a:endParaRPr lang="en-US" dirty="0"/>
           </a:p>
         </p:txBody>
       </p:sp>
@@ -17429,12 +17796,46 @@
             <p:ph type="body" sz="quarter" idx="29"/>
           </p:nvPr>
         </p:nvSpPr>
-        <p:spPr/>
+        <p:spPr>
+          <a:gradFill flip="none" rotWithShape="1">
+            <a:gsLst>
+              <a:gs pos="0">
+                <a:srgbClr val="FF9300">
+                  <a:tint val="66000"/>
+                  <a:satMod val="160000"/>
+                </a:srgbClr>
+              </a:gs>
+              <a:gs pos="50000">
+                <a:srgbClr val="FF9300">
+                  <a:tint val="44500"/>
+                  <a:satMod val="160000"/>
+                </a:srgbClr>
+              </a:gs>
+              <a:gs pos="100000">
+                <a:srgbClr val="FF9300">
+                  <a:tint val="23500"/>
+                  <a:satMod val="160000"/>
+                </a:srgbClr>
+              </a:gs>
+            </a:gsLst>
+            <a:path path="circle">
+              <a:fillToRect l="50000" t="50000" r="50000" b="50000"/>
+            </a:path>
+            <a:tileRect/>
+          </a:gradFill>
+          <a:ln>
+            <a:solidFill>
+              <a:schemeClr val="accent5">
+                <a:lumMod val="50000"/>
+              </a:schemeClr>
+            </a:solidFill>
+          </a:ln>
+        </p:spPr>
         <p:txBody>
           <a:bodyPr/>
           <a:lstStyle/>
           <a:p>
-            <a:endParaRPr lang="en-US"/>
+            <a:endParaRPr lang="en-US" dirty="0"/>
           </a:p>
         </p:txBody>
       </p:sp>
@@ -17484,7 +17885,7 @@
             <p:spPr>
               <a:xfrm>
                 <a:off x="459674" y="14951552"/>
-                <a:ext cx="10056813" cy="15956718"/>
+                <a:ext cx="10056813" cy="16297966"/>
               </a:xfrm>
             </p:spPr>
             <p:txBody>
@@ -17497,23 +17898,43 @@
                   </a:lnSpc>
                 </a:pPr>
                 <a:r>
-                  <a:rPr lang="en-US" dirty="0"/>
+                  <a:rPr lang="en-US" sz="2800" dirty="0">
+                    <a:solidFill>
+                      <a:schemeClr val="tx1"/>
+                    </a:solidFill>
+                  </a:rPr>
                   <a:t>In this project, I will explore how </a:t>
                 </a:r>
                 <a:r>
-                  <a:rPr lang="en-US" dirty="0" err="1"/>
+                  <a:rPr lang="en-US" sz="2800" dirty="0" err="1">
+                    <a:solidFill>
+                      <a:schemeClr val="tx1"/>
+                    </a:solidFill>
+                  </a:rPr>
                   <a:t>anharmonic</a:t>
                 </a:r>
                 <a:r>
-                  <a:rPr lang="en-US" dirty="0"/>
+                  <a:rPr lang="en-US" sz="2800" dirty="0">
+                    <a:solidFill>
+                      <a:schemeClr val="tx1"/>
+                    </a:solidFill>
+                  </a:rPr>
                   <a:t> and chaotic behavior progressively arises in pendulum dynamics by simulating the above differential equation by implementing a fourth order Runge-</a:t>
                 </a:r>
                 <a:r>
-                  <a:rPr lang="en-US" dirty="0" err="1"/>
+                  <a:rPr lang="en-US" sz="2800" dirty="0" err="1">
+                    <a:solidFill>
+                      <a:schemeClr val="tx1"/>
+                    </a:solidFill>
+                  </a:rPr>
                   <a:t>Kutta</a:t>
                 </a:r>
                 <a:r>
-                  <a:rPr lang="en-US" dirty="0"/>
+                  <a:rPr lang="en-US" sz="2800" dirty="0">
+                    <a:solidFill>
+                      <a:schemeClr val="tx1"/>
+                    </a:solidFill>
+                  </a:rPr>
                   <a:t> method in Python. The time step for each simulation was set to 0.001 s.</a:t>
                 </a:r>
               </a:p>
@@ -17524,31 +17945,47 @@
                   </a:lnSpc>
                 </a:pPr>
                 <a:r>
-                  <a:rPr lang="en-US" dirty="0"/>
+                  <a:rPr lang="en-US" sz="2800" dirty="0">
+                    <a:solidFill>
+                      <a:schemeClr val="tx1"/>
+                    </a:solidFill>
+                  </a:rPr>
                   <a:t>By manipulating the frictional and driving force parameters, </a:t>
                 </a:r>
                 <a14:m>
                   <m:oMath xmlns:m="http://schemas.openxmlformats.org/officeDocument/2006/math">
                     <m:r>
-                      <a:rPr lang="en-US" i="1">
+                      <a:rPr lang="en-US" sz="2800" i="1">
+                        <a:solidFill>
+                          <a:schemeClr val="tx1"/>
+                        </a:solidFill>
                         <a:latin typeface="Cambria Math" panose="02040503050406030204" pitchFamily="18" charset="0"/>
                       </a:rPr>
                       <m:t>𝜒</m:t>
                     </m:r>
                     <m:r>
-                      <a:rPr lang="en-US" b="0" i="1" smtClean="0">
+                      <a:rPr lang="en-US" sz="2800" b="0" i="1" smtClean="0">
+                        <a:solidFill>
+                          <a:schemeClr val="tx1"/>
+                        </a:solidFill>
                         <a:latin typeface="Cambria Math" panose="02040503050406030204" pitchFamily="18" charset="0"/>
                       </a:rPr>
                       <m:t>,  </m:t>
                     </m:r>
                     <m:r>
-                      <a:rPr lang="en-US" b="0" i="1" smtClean="0">
+                      <a:rPr lang="en-US" sz="2800" b="0" i="1" smtClean="0">
+                        <a:solidFill>
+                          <a:schemeClr val="tx1"/>
+                        </a:solidFill>
                         <a:latin typeface="Cambria Math" panose="02040503050406030204" pitchFamily="18" charset="0"/>
                       </a:rPr>
                       <m:t>𝜂</m:t>
                     </m:r>
                     <m:r>
-                      <a:rPr lang="en-US" b="0" i="1" smtClean="0">
+                      <a:rPr lang="en-US" sz="2800" b="0" i="1" smtClean="0">
+                        <a:solidFill>
+                          <a:schemeClr val="tx1"/>
+                        </a:solidFill>
                         <a:latin typeface="Cambria Math" panose="02040503050406030204" pitchFamily="18" charset="0"/>
                       </a:rPr>
                       <m:t>,  </m:t>
@@ -17557,7 +17994,10 @@
                       <m:rPr>
                         <m:nor/>
                       </m:rPr>
-                      <a:rPr lang="en-US" b="0" i="0" smtClean="0">
+                      <a:rPr lang="en-US" sz="2800" b="0" i="0" smtClean="0">
+                        <a:solidFill>
+                          <a:schemeClr val="tx1"/>
+                        </a:solidFill>
                         <a:latin typeface="Cambria Math" panose="02040503050406030204" pitchFamily="18" charset="0"/>
                       </a:rPr>
                       <m:t>and</m:t>
@@ -17566,7 +18006,10 @@
                       <m:rPr>
                         <m:nor/>
                       </m:rPr>
-                      <a:rPr lang="en-US" b="0" i="0" smtClean="0">
+                      <a:rPr lang="en-US" sz="2800" b="0" i="0" smtClean="0">
+                        <a:solidFill>
+                          <a:schemeClr val="tx1"/>
+                        </a:solidFill>
                         <a:latin typeface="Cambria Math" panose="02040503050406030204" pitchFamily="18" charset="0"/>
                       </a:rPr>
                       <m:t> </m:t>
@@ -17574,14 +18017,20 @@
                     <m:sSub>
                       <m:sSubPr>
                         <m:ctrlPr>
-                          <a:rPr lang="en-US" b="0" i="1" smtClean="0">
+                          <a:rPr lang="en-US" sz="2800" b="0" i="1" smtClean="0">
+                            <a:solidFill>
+                              <a:schemeClr val="tx1"/>
+                            </a:solidFill>
                             <a:latin typeface="Cambria Math" panose="02040503050406030204" pitchFamily="18" charset="0"/>
                           </a:rPr>
                         </m:ctrlPr>
                       </m:sSubPr>
                       <m:e>
                         <m:r>
-                          <a:rPr lang="en-US" b="0" i="1" smtClean="0">
+                          <a:rPr lang="en-US" sz="2800" b="0" i="1" smtClean="0">
+                            <a:solidFill>
+                              <a:schemeClr val="tx1"/>
+                            </a:solidFill>
                             <a:latin typeface="Cambria Math" panose="02040503050406030204" pitchFamily="18" charset="0"/>
                           </a:rPr>
                           <m:t>𝜔</m:t>
@@ -17589,7 +18038,10 @@
                       </m:e>
                       <m:sub>
                         <m:r>
-                          <a:rPr lang="en-US" b="0" i="1" smtClean="0">
+                          <a:rPr lang="en-US" sz="2800" b="0" i="1" smtClean="0">
+                            <a:solidFill>
+                              <a:schemeClr val="tx1"/>
+                            </a:solidFill>
                             <a:latin typeface="Cambria Math" panose="02040503050406030204" pitchFamily="18" charset="0"/>
                           </a:rPr>
                           <m:t>𝑑</m:t>
@@ -17599,7 +18051,11 @@
                   </m:oMath>
                 </a14:m>
                 <a:r>
-                  <a:rPr lang="en-US" dirty="0"/>
+                  <a:rPr lang="en-US" sz="2800" dirty="0">
+                    <a:solidFill>
+                      <a:schemeClr val="tx1"/>
+                    </a:solidFill>
+                  </a:rPr>
                   <a:t> for a fixed </a:t>
                 </a:r>
                 <a14:m>
@@ -17607,14 +18063,20 @@
                     <m:sSub>
                       <m:sSubPr>
                         <m:ctrlPr>
-                          <a:rPr lang="en-US" i="1">
+                          <a:rPr lang="en-US" sz="2800" i="1">
+                            <a:solidFill>
+                              <a:schemeClr val="tx1"/>
+                            </a:solidFill>
                             <a:latin typeface="Cambria Math" panose="02040503050406030204" pitchFamily="18" charset="0"/>
                           </a:rPr>
                         </m:ctrlPr>
                       </m:sSubPr>
                       <m:e>
                         <m:r>
-                          <a:rPr lang="en-US" i="1">
+                          <a:rPr lang="en-US" sz="2800" i="1">
+                            <a:solidFill>
+                              <a:schemeClr val="tx1"/>
+                            </a:solidFill>
                             <a:latin typeface="Cambria Math" panose="02040503050406030204" pitchFamily="18" charset="0"/>
                           </a:rPr>
                           <m:t>𝜔</m:t>
@@ -17622,7 +18084,10 @@
                       </m:e>
                       <m:sub>
                         <m:r>
-                          <a:rPr lang="en-US" i="1">
+                          <a:rPr lang="en-US" sz="2800" i="1">
+                            <a:solidFill>
+                              <a:schemeClr val="tx1"/>
+                            </a:solidFill>
                             <a:latin typeface="Cambria Math" panose="02040503050406030204" pitchFamily="18" charset="0"/>
                           </a:rPr>
                           <m:t>0</m:t>
@@ -17632,15 +18097,27 @@
                   </m:oMath>
                 </a14:m>
                 <a:r>
-                  <a:rPr lang="en-US" dirty="0"/>
+                  <a:rPr lang="en-US" sz="2800" dirty="0">
+                    <a:solidFill>
+                      <a:schemeClr val="tx1"/>
+                    </a:solidFill>
+                  </a:rPr>
                   <a:t>, we can study three main cases of </a:t>
                 </a:r>
                 <a:r>
-                  <a:rPr lang="en-US" dirty="0" err="1"/>
+                  <a:rPr lang="en-US" sz="2800" dirty="0" err="1">
+                    <a:solidFill>
+                      <a:schemeClr val="tx1"/>
+                    </a:solidFill>
+                  </a:rPr>
                   <a:t>oscillatiors</a:t>
                 </a:r>
                 <a:r>
-                  <a:rPr lang="en-US" dirty="0"/>
+                  <a:rPr lang="en-US" sz="2800" dirty="0">
+                    <a:solidFill>
+                      <a:schemeClr val="tx1"/>
+                    </a:solidFill>
+                  </a:rPr>
                   <a:t>:</a:t>
                 </a:r>
               </a:p>
@@ -17653,29 +18130,16 @@
                   <a:buAutoNum type="romanUcPeriod"/>
                 </a:pPr>
                 <a:r>
-                  <a:rPr lang="en-US" dirty="0"/>
+                  <a:rPr lang="en-US" sz="2800" dirty="0">
+                    <a:solidFill>
+                      <a:schemeClr val="tx1"/>
+                    </a:solidFill>
+                  </a:rPr>
                   <a:t>Simple Harmonic Oscillator:</a:t>
                 </a:r>
-                <a:endParaRPr lang="en-US" b="0" i="1" dirty="0">
+                <a:endParaRPr lang="en-US" sz="2800" b="0" i="1" dirty="0">
                   <a:solidFill>
-                    <a:schemeClr val="accent5">
-                      <a:lumMod val="50000"/>
-                    </a:schemeClr>
-                  </a:solidFill>
-                  <a:latin typeface="Cambria Math" panose="02040503050406030204" pitchFamily="18" charset="0"/>
-                </a:endParaRPr>
-              </a:p>
-              <a:p>
-                <a:pPr>
-                  <a:lnSpc>
-                    <a:spcPct val="100000"/>
-                  </a:lnSpc>
-                </a:pPr>
-                <a:endParaRPr lang="en-US" b="0" i="1" dirty="0">
-                  <a:solidFill>
-                    <a:schemeClr val="accent5">
-                      <a:lumMod val="50000"/>
-                    </a:schemeClr>
+                    <a:schemeClr val="tx1"/>
                   </a:solidFill>
                   <a:latin typeface="Cambria Math" panose="02040503050406030204" pitchFamily="18" charset="0"/>
                 </a:endParaRPr>
@@ -17696,11 +18160,9 @@
                         <m:accPr>
                           <m:chr m:val="̈"/>
                           <m:ctrlPr>
-                            <a:rPr lang="en-US" sz="2800" b="0" i="1" dirty="0" smtClean="0">
+                            <a:rPr lang="en-US" b="0" i="1" dirty="0" smtClean="0">
                               <a:solidFill>
-                                <a:schemeClr val="accent5">
-                                  <a:lumMod val="50000"/>
-                                </a:schemeClr>
+                                <a:schemeClr val="tx1"/>
                               </a:solidFill>
                               <a:latin typeface="Cambria Math" panose="02040503050406030204" pitchFamily="18" charset="0"/>
                             </a:rPr>
@@ -17708,11 +18170,9 @@
                         </m:accPr>
                         <m:e>
                           <m:r>
-                            <a:rPr lang="en-US" sz="2800" b="0" i="1" dirty="0" smtClean="0">
+                            <a:rPr lang="en-US" b="0" i="1" dirty="0" smtClean="0">
                               <a:solidFill>
-                                <a:schemeClr val="accent5">
-                                  <a:lumMod val="50000"/>
-                                </a:schemeClr>
+                                <a:schemeClr val="tx1"/>
                               </a:solidFill>
                               <a:latin typeface="Cambria Math" panose="02040503050406030204" pitchFamily="18" charset="0"/>
                             </a:rPr>
@@ -17721,11 +18181,9 @@
                         </m:e>
                       </m:acc>
                       <m:r>
-                        <a:rPr lang="en-US" sz="2800" b="0" i="1" dirty="0" smtClean="0">
-                          <a:solidFill>
-                            <a:schemeClr val="accent5">
-                              <a:lumMod val="50000"/>
-                            </a:schemeClr>
+                        <a:rPr lang="en-US" b="0" i="1" dirty="0" smtClean="0">
+                          <a:solidFill>
+                            <a:schemeClr val="tx1"/>
                           </a:solidFill>
                           <a:latin typeface="Cambria Math" panose="02040503050406030204" pitchFamily="18" charset="0"/>
                         </a:rPr>
@@ -17734,11 +18192,9 @@
                       <m:sSubSup>
                         <m:sSubSupPr>
                           <m:ctrlPr>
-                            <a:rPr lang="en-US" sz="2800" b="0" i="1" dirty="0" smtClean="0">
+                            <a:rPr lang="en-US" b="0" i="1" dirty="0" smtClean="0">
                               <a:solidFill>
-                                <a:schemeClr val="accent5">
-                                  <a:lumMod val="50000"/>
-                                </a:schemeClr>
+                                <a:schemeClr val="tx1"/>
                               </a:solidFill>
                               <a:latin typeface="Cambria Math" panose="02040503050406030204" pitchFamily="18" charset="0"/>
                             </a:rPr>
@@ -17746,11 +18202,9 @@
                         </m:sSubSupPr>
                         <m:e>
                           <m:r>
-                            <a:rPr lang="en-US" sz="2800" b="0" i="1" dirty="0" smtClean="0">
+                            <a:rPr lang="en-US" b="0" i="1" dirty="0" smtClean="0">
                               <a:solidFill>
-                                <a:schemeClr val="accent5">
-                                  <a:lumMod val="50000"/>
-                                </a:schemeClr>
+                                <a:schemeClr val="tx1"/>
                               </a:solidFill>
                               <a:latin typeface="Cambria Math" panose="02040503050406030204" pitchFamily="18" charset="0"/>
                             </a:rPr>
@@ -17759,11 +18213,9 @@
                         </m:e>
                         <m:sub>
                           <m:r>
-                            <a:rPr lang="en-US" sz="2800" b="0" i="1" dirty="0" smtClean="0">
+                            <a:rPr lang="en-US" b="0" i="1" dirty="0" smtClean="0">
                               <a:solidFill>
-                                <a:schemeClr val="accent5">
-                                  <a:lumMod val="50000"/>
-                                </a:schemeClr>
+                                <a:schemeClr val="tx1"/>
                               </a:solidFill>
                               <a:latin typeface="Cambria Math" panose="02040503050406030204" pitchFamily="18" charset="0"/>
                             </a:rPr>
@@ -17772,11 +18224,9 @@
                         </m:sub>
                         <m:sup>
                           <m:r>
-                            <a:rPr lang="en-US" sz="2800" b="0" i="1" dirty="0" smtClean="0">
+                            <a:rPr lang="en-US" b="0" i="1" dirty="0" smtClean="0">
                               <a:solidFill>
-                                <a:schemeClr val="accent5">
-                                  <a:lumMod val="50000"/>
-                                </a:schemeClr>
+                                <a:schemeClr val="tx1"/>
                               </a:solidFill>
                               <a:latin typeface="Cambria Math" panose="02040503050406030204" pitchFamily="18" charset="0"/>
                             </a:rPr>
@@ -17785,22 +18235,18 @@
                         </m:sup>
                       </m:sSubSup>
                       <m:r>
-                        <a:rPr lang="en-US" sz="2800" b="0" i="1" dirty="0" smtClean="0">
-                          <a:solidFill>
-                            <a:schemeClr val="accent5">
-                              <a:lumMod val="50000"/>
-                            </a:schemeClr>
+                        <a:rPr lang="en-US" b="0" i="1" dirty="0" smtClean="0">
+                          <a:solidFill>
+                            <a:schemeClr val="tx1"/>
                           </a:solidFill>
                           <a:latin typeface="Cambria Math" panose="02040503050406030204" pitchFamily="18" charset="0"/>
                         </a:rPr>
                         <m:t>𝜙</m:t>
                       </m:r>
                       <m:r>
-                        <a:rPr lang="en-US" sz="2800" b="0" i="1" dirty="0" smtClean="0">
-                          <a:solidFill>
-                            <a:schemeClr val="accent5">
-                              <a:lumMod val="50000"/>
-                            </a:schemeClr>
+                        <a:rPr lang="en-US" b="0" i="1" dirty="0" smtClean="0">
+                          <a:solidFill>
+                            <a:schemeClr val="tx1"/>
                           </a:solidFill>
                           <a:latin typeface="Cambria Math" panose="02040503050406030204" pitchFamily="18" charset="0"/>
                         </a:rPr>
@@ -17809,14 +18255,20 @@
                       <m:sSub>
                         <m:sSubPr>
                           <m:ctrlPr>
-                            <a:rPr lang="en-US" sz="2800" i="1">
+                            <a:rPr lang="en-US" i="1">
+                              <a:solidFill>
+                                <a:schemeClr val="tx1"/>
+                              </a:solidFill>
                               <a:latin typeface="Cambria Math" panose="02040503050406030204" pitchFamily="18" charset="0"/>
                             </a:rPr>
                           </m:ctrlPr>
                         </m:sSubPr>
                         <m:e>
                           <m:r>
-                            <a:rPr lang="en-US" sz="2800" i="1">
+                            <a:rPr lang="en-US" i="1">
+                              <a:solidFill>
+                                <a:schemeClr val="tx1"/>
+                              </a:solidFill>
                               <a:latin typeface="Cambria Math" panose="02040503050406030204" pitchFamily="18" charset="0"/>
                             </a:rPr>
                             <m:t>𝜔</m:t>
@@ -17824,7 +18276,10 @@
                         </m:e>
                         <m:sub>
                           <m:r>
-                            <a:rPr lang="en-US" sz="2800" i="1">
+                            <a:rPr lang="en-US" i="1">
+                              <a:solidFill>
+                                <a:schemeClr val="tx1"/>
+                              </a:solidFill>
                               <a:latin typeface="Cambria Math" panose="02040503050406030204" pitchFamily="18" charset="0"/>
                             </a:rPr>
                             <m:t>0</m:t>
@@ -17832,7 +18287,10 @@
                         </m:sub>
                       </m:sSub>
                       <m:r>
-                        <a:rPr lang="en-US" sz="2800" i="1">
+                        <a:rPr lang="en-US" i="1">
+                          <a:solidFill>
+                            <a:schemeClr val="tx1"/>
+                          </a:solidFill>
                           <a:latin typeface="Cambria Math" panose="02040503050406030204" pitchFamily="18" charset="0"/>
                         </a:rPr>
                         <m:t>𝜒</m:t>
@@ -17841,11 +18299,9 @@
                         <m:accPr>
                           <m:chr m:val="̇"/>
                           <m:ctrlPr>
-                            <a:rPr lang="en-US" sz="2800" b="0" i="1" dirty="0" smtClean="0">
+                            <a:rPr lang="en-US" b="0" i="1" dirty="0" smtClean="0">
                               <a:solidFill>
-                                <a:schemeClr val="accent5">
-                                  <a:lumMod val="50000"/>
-                                </a:schemeClr>
+                                <a:schemeClr val="tx1"/>
                               </a:solidFill>
                               <a:latin typeface="Cambria Math" panose="02040503050406030204" pitchFamily="18" charset="0"/>
                             </a:rPr>
@@ -17853,11 +18309,9 @@
                         </m:accPr>
                         <m:e>
                           <m:r>
-                            <a:rPr lang="en-US" sz="2800" b="0" i="1" dirty="0" smtClean="0">
+                            <a:rPr lang="en-US" b="0" i="1" dirty="0" smtClean="0">
                               <a:solidFill>
-                                <a:schemeClr val="accent5">
-                                  <a:lumMod val="50000"/>
-                                </a:schemeClr>
+                                <a:schemeClr val="tx1"/>
                               </a:solidFill>
                               <a:latin typeface="Cambria Math" panose="02040503050406030204" pitchFamily="18" charset="0"/>
                             </a:rPr>
@@ -17866,11 +18320,9 @@
                         </m:e>
                       </m:acc>
                       <m:r>
-                        <a:rPr lang="en-US" sz="2800" b="0" i="1" dirty="0" smtClean="0">
-                          <a:solidFill>
-                            <a:schemeClr val="accent5">
-                              <a:lumMod val="50000"/>
-                            </a:schemeClr>
+                        <a:rPr lang="en-US" b="0" i="1" dirty="0" smtClean="0">
+                          <a:solidFill>
+                            <a:schemeClr val="tx1"/>
                           </a:solidFill>
                           <a:latin typeface="Cambria Math" panose="02040503050406030204" pitchFamily="18" charset="0"/>
                         </a:rPr>
@@ -17879,11 +18331,9 @@
                       <m:d>
                         <m:dPr>
                           <m:ctrlPr>
-                            <a:rPr lang="en-US" sz="2800" b="0" i="1" dirty="0" smtClean="0">
+                            <a:rPr lang="en-US" b="0" i="1" dirty="0" smtClean="0">
                               <a:solidFill>
-                                <a:schemeClr val="accent5">
-                                  <a:lumMod val="50000"/>
-                                </a:schemeClr>
+                                <a:schemeClr val="tx1"/>
                               </a:solidFill>
                               <a:latin typeface="Cambria Math" panose="02040503050406030204" pitchFamily="18" charset="0"/>
                             </a:rPr>
@@ -17891,11 +18341,9 @@
                         </m:dPr>
                         <m:e>
                           <m:r>
-                            <a:rPr lang="en-US" sz="2800" b="0" i="1" dirty="0" smtClean="0">
+                            <a:rPr lang="en-US" b="0" i="1" dirty="0" smtClean="0">
                               <a:solidFill>
-                                <a:schemeClr val="accent5">
-                                  <a:lumMod val="50000"/>
-                                </a:schemeClr>
+                                <a:schemeClr val="tx1"/>
                               </a:solidFill>
                               <a:latin typeface="Cambria Math" panose="02040503050406030204" pitchFamily="18" charset="0"/>
                             </a:rPr>
@@ -17907,19 +18355,15 @@
                   </m:oMathPara>
                 </a14:m>
                 <a:br>
-                  <a:rPr lang="en-US" sz="2800" dirty="0">
+                  <a:rPr lang="en-US" dirty="0">
                     <a:solidFill>
-                      <a:schemeClr val="accent5">
-                        <a:lumMod val="50000"/>
-                      </a:schemeClr>
+                      <a:schemeClr val="tx1"/>
                     </a:solidFill>
                   </a:rPr>
                 </a:br>
-                <a:endParaRPr lang="en-US" sz="2800" dirty="0">
+                <a:endParaRPr lang="en-US" dirty="0">
                   <a:solidFill>
-                    <a:schemeClr val="accent5">
-                      <a:lumMod val="50000"/>
-                    </a:schemeClr>
+                    <a:schemeClr val="tx1"/>
                   </a:solidFill>
                 </a:endParaRPr>
               </a:p>
@@ -17930,22 +18374,36 @@
                   </a:lnSpc>
                 </a:pPr>
                 <a:br>
-                  <a:rPr lang="en-US" dirty="0"/>
+                  <a:rPr lang="en-US" dirty="0">
+                    <a:solidFill>
+                      <a:schemeClr val="tx1"/>
+                    </a:solidFill>
+                  </a:rPr>
                 </a:br>
                 <a:br>
                   <a:rPr lang="en-US" dirty="0">
                     <a:solidFill>
-                      <a:schemeClr val="accent5">
-                        <a:lumMod val="50000"/>
-                      </a:schemeClr>
+                      <a:schemeClr val="tx1"/>
                     </a:solidFill>
                   </a:rPr>
                 </a:br>
                 <a:endParaRPr lang="en-US" dirty="0">
                   <a:solidFill>
-                    <a:schemeClr val="accent5">
-                      <a:lumMod val="50000"/>
-                    </a:schemeClr>
+                    <a:schemeClr val="tx1"/>
+                  </a:solidFill>
+                </a:endParaRPr>
+              </a:p>
+              <a:p>
+                <a:pPr marL="514350" indent="-514350">
+                  <a:lnSpc>
+                    <a:spcPct val="100000"/>
+                  </a:lnSpc>
+                  <a:buFont typeface="+mj-lt"/>
+                  <a:buAutoNum type="romanUcPeriod" startAt="2"/>
+                </a:pPr>
+                <a:endParaRPr lang="en-US" sz="2800" dirty="0">
+                  <a:solidFill>
+                    <a:schemeClr val="tx1"/>
                   </a:solidFill>
                 </a:endParaRPr>
               </a:p>
@@ -17958,230 +18416,274 @@
                   <a:buAutoNum type="romanUcPeriod" startAt="2"/>
                 </a:pPr>
                 <a:r>
-                  <a:rPr lang="en-US" dirty="0" err="1">
+                  <a:rPr lang="en-US" sz="2800" dirty="0" err="1">
                     <a:solidFill>
-                      <a:schemeClr val="accent5">
-                        <a:lumMod val="50000"/>
-                      </a:schemeClr>
+                      <a:schemeClr val="tx1"/>
                     </a:solidFill>
                   </a:rPr>
                   <a:t>Anharmonic</a:t>
                 </a:r>
                 <a:r>
-                  <a:rPr lang="en-US" dirty="0">
+                  <a:rPr lang="en-US" sz="2800" dirty="0">
                     <a:solidFill>
-                      <a:schemeClr val="accent5">
-                        <a:lumMod val="50000"/>
-                      </a:schemeClr>
+                      <a:schemeClr val="tx1"/>
                     </a:solidFill>
                   </a:rPr>
                   <a:t> Oscillator:</a:t>
                 </a:r>
                 <a:br>
-                  <a:rPr lang="en-US" dirty="0">
+                  <a:rPr lang="en-US" sz="2800" dirty="0">
                     <a:solidFill>
-                      <a:schemeClr val="accent5">
-                        <a:lumMod val="50000"/>
-                      </a:schemeClr>
+                      <a:schemeClr val="tx1"/>
                     </a:solidFill>
                   </a:rPr>
                 </a:br>
-                <a:endParaRPr lang="en-US" dirty="0">
-                  <a:solidFill>
-                    <a:schemeClr val="accent5">
-                      <a:lumMod val="50000"/>
-                    </a:schemeClr>
-                  </a:solidFill>
-                </a:endParaRPr>
-              </a:p>
-              <a:p>
-                <a:pPr>
-                  <a:lnSpc>
-                    <a:spcPct val="100000"/>
-                  </a:lnSpc>
-                </a:pPr>
                 <a14:m>
-                  <m:oMathPara xmlns:m="http://schemas.openxmlformats.org/officeDocument/2006/math">
-                    <m:oMathParaPr>
-                      <m:jc m:val="right"/>
-                    </m:oMathParaPr>
-                    <m:oMath xmlns:m="http://schemas.openxmlformats.org/officeDocument/2006/math">
-                      <m:acc>
-                        <m:accPr>
-                          <m:chr m:val="̈"/>
-                          <m:ctrlPr>
-                            <a:rPr lang="en-US" sz="2800" b="0" i="1" smtClean="0">
-                              <a:latin typeface="Cambria Math" panose="02040503050406030204" pitchFamily="18" charset="0"/>
-                            </a:rPr>
-                          </m:ctrlPr>
-                        </m:accPr>
-                        <m:e>
-                          <m:r>
-                            <a:rPr lang="en-US" sz="2800" b="0" i="1" smtClean="0">
-                              <a:latin typeface="Cambria Math" panose="02040503050406030204" pitchFamily="18" charset="0"/>
-                            </a:rPr>
-                            <m:t>𝜙</m:t>
-                          </m:r>
-                        </m:e>
-                      </m:acc>
-                      <m:r>
-                        <a:rPr lang="en-US" sz="2800" b="0" i="1" dirty="0" smtClean="0">
-                          <a:latin typeface="Cambria Math" panose="02040503050406030204" pitchFamily="18" charset="0"/>
-                        </a:rPr>
-                        <m:t>=−</m:t>
-                      </m:r>
-                      <m:sSubSup>
-                        <m:sSubSupPr>
-                          <m:ctrlPr>
-                            <a:rPr lang="en-US" sz="2800" b="0" i="1" dirty="0" smtClean="0">
-                              <a:latin typeface="Cambria Math" panose="02040503050406030204" pitchFamily="18" charset="0"/>
-                            </a:rPr>
-                          </m:ctrlPr>
-                        </m:sSubSupPr>
-                        <m:e>
-                          <m:r>
-                            <a:rPr lang="en-US" sz="2800" b="0" i="1" dirty="0" smtClean="0">
-                              <a:latin typeface="Cambria Math" panose="02040503050406030204" pitchFamily="18" charset="0"/>
-                            </a:rPr>
-                            <m:t>𝜔</m:t>
-                          </m:r>
-                        </m:e>
-                        <m:sub>
-                          <m:r>
-                            <a:rPr lang="en-US" sz="2800" b="0" i="1" dirty="0" smtClean="0">
-                              <a:latin typeface="Cambria Math" panose="02040503050406030204" pitchFamily="18" charset="0"/>
-                            </a:rPr>
-                            <m:t>0</m:t>
-                          </m:r>
-                        </m:sub>
-                        <m:sup>
-                          <m:r>
-                            <a:rPr lang="en-US" sz="2800" b="0" i="1" dirty="0" smtClean="0">
-                              <a:latin typeface="Cambria Math" panose="02040503050406030204" pitchFamily="18" charset="0"/>
-                            </a:rPr>
-                            <m:t>2</m:t>
-                          </m:r>
-                        </m:sup>
-                      </m:sSubSup>
-                      <m:r>
-                        <m:rPr>
-                          <m:nor/>
-                        </m:rPr>
-                        <a:rPr lang="en-US" sz="2800" b="0" i="0" dirty="0" smtClean="0">
-                          <a:latin typeface="Cambria Math" panose="02040503050406030204" pitchFamily="18" charset="0"/>
-                        </a:rPr>
-                        <m:t>sin</m:t>
-                      </m:r>
-                      <m:d>
-                        <m:dPr>
-                          <m:ctrlPr>
-                            <a:rPr lang="en-US" sz="2800" b="0" i="1" dirty="0" smtClean="0">
-                              <a:latin typeface="Cambria Math" panose="02040503050406030204" pitchFamily="18" charset="0"/>
-                            </a:rPr>
-                          </m:ctrlPr>
-                        </m:dPr>
-                        <m:e>
-                          <m:r>
-                            <a:rPr lang="en-US" sz="2800" b="0" i="1" dirty="0" smtClean="0">
-                              <a:latin typeface="Cambria Math" panose="02040503050406030204" pitchFamily="18" charset="0"/>
-                            </a:rPr>
-                            <m:t>𝜙</m:t>
-                          </m:r>
-                        </m:e>
-                      </m:d>
-                      <m:r>
-                        <a:rPr lang="en-US" sz="2800" b="0" i="1" dirty="0" smtClean="0">
-                          <a:latin typeface="Cambria Math" panose="02040503050406030204" pitchFamily="18" charset="0"/>
-                        </a:rPr>
-                        <m:t>−</m:t>
-                      </m:r>
-                      <m:r>
-                        <a:rPr lang="en-US" sz="2800" i="1">
-                          <a:latin typeface="Cambria Math" panose="02040503050406030204" pitchFamily="18" charset="0"/>
-                        </a:rPr>
-                        <m:t>2</m:t>
-                      </m:r>
-                      <m:sSub>
-                        <m:sSubPr>
-                          <m:ctrlPr>
-                            <a:rPr lang="en-US" sz="2800" i="1">
-                              <a:latin typeface="Cambria Math" panose="02040503050406030204" pitchFamily="18" charset="0"/>
-                            </a:rPr>
-                          </m:ctrlPr>
-                        </m:sSubPr>
-                        <m:e>
-                          <m:r>
-                            <a:rPr lang="en-US" sz="2800" i="1">
-                              <a:latin typeface="Cambria Math" panose="02040503050406030204" pitchFamily="18" charset="0"/>
-                            </a:rPr>
-                            <m:t>𝜔</m:t>
-                          </m:r>
-                        </m:e>
-                        <m:sub>
-                          <m:r>
-                            <a:rPr lang="en-US" sz="2800" i="1">
-                              <a:latin typeface="Cambria Math" panose="02040503050406030204" pitchFamily="18" charset="0"/>
-                            </a:rPr>
-                            <m:t>0</m:t>
-                          </m:r>
-                        </m:sub>
-                      </m:sSub>
-                      <m:r>
-                        <a:rPr lang="en-US" sz="2800" i="1">
-                          <a:latin typeface="Cambria Math" panose="02040503050406030204" pitchFamily="18" charset="0"/>
-                        </a:rPr>
-                        <m:t>𝜒</m:t>
-                      </m:r>
-                      <m:acc>
-                        <m:accPr>
-                          <m:chr m:val="̇"/>
-                          <m:ctrlPr>
-                            <a:rPr lang="en-US" sz="2800" b="0" i="1" dirty="0" smtClean="0">
-                              <a:latin typeface="Cambria Math" panose="02040503050406030204" pitchFamily="18" charset="0"/>
-                            </a:rPr>
-                          </m:ctrlPr>
-                        </m:accPr>
-                        <m:e>
-                          <m:r>
-                            <a:rPr lang="en-US" sz="2800" b="0" i="1" dirty="0" smtClean="0">
-                              <a:latin typeface="Cambria Math" panose="02040503050406030204" pitchFamily="18" charset="0"/>
-                            </a:rPr>
-                            <m:t>𝜙</m:t>
-                          </m:r>
-                        </m:e>
-                      </m:acc>
-                      <m:r>
-                        <a:rPr lang="en-US" sz="2800" b="0" i="1" dirty="0" smtClean="0">
-                          <a:latin typeface="Cambria Math" panose="02040503050406030204" pitchFamily="18" charset="0"/>
-                        </a:rPr>
-                        <m:t>  </m:t>
-                      </m:r>
-                      <m:d>
-                        <m:dPr>
-                          <m:ctrlPr>
-                            <a:rPr lang="en-US" sz="2800" b="0" i="1" dirty="0" smtClean="0">
-                              <a:latin typeface="Cambria Math" panose="02040503050406030204" pitchFamily="18" charset="0"/>
-                            </a:rPr>
-                          </m:ctrlPr>
-                        </m:dPr>
-                        <m:e>
-                          <m:r>
-                            <a:rPr lang="en-US" sz="2800" b="0" i="1" dirty="0" smtClean="0">
-                              <a:latin typeface="Cambria Math" panose="02040503050406030204" pitchFamily="18" charset="0"/>
-                            </a:rPr>
-                            <m:t>2</m:t>
-                          </m:r>
-                        </m:e>
-                      </m:d>
-                    </m:oMath>
-                  </m:oMathPara>
+                  <m:oMath xmlns:m="http://schemas.openxmlformats.org/officeDocument/2006/math">
+                    <m:acc>
+                      <m:accPr>
+                        <m:chr m:val="̈"/>
+                        <m:ctrlPr>
+                          <a:rPr lang="en-US" b="0" i="1" smtClean="0">
+                            <a:solidFill>
+                              <a:schemeClr val="tx1"/>
+                            </a:solidFill>
+                            <a:latin typeface="Cambria Math" panose="02040503050406030204" pitchFamily="18" charset="0"/>
+                          </a:rPr>
+                        </m:ctrlPr>
+                      </m:accPr>
+                      <m:e>
+                        <m:r>
+                          <a:rPr lang="en-US" b="0" i="1" smtClean="0">
+                            <a:solidFill>
+                              <a:schemeClr val="tx1"/>
+                            </a:solidFill>
+                            <a:latin typeface="Cambria Math" panose="02040503050406030204" pitchFamily="18" charset="0"/>
+                          </a:rPr>
+                          <m:t>𝜙</m:t>
+                        </m:r>
+                      </m:e>
+                    </m:acc>
+                    <m:r>
+                      <a:rPr lang="en-US" b="0" i="1" dirty="0" smtClean="0">
+                        <a:solidFill>
+                          <a:schemeClr val="tx1"/>
+                        </a:solidFill>
+                        <a:latin typeface="Cambria Math" panose="02040503050406030204" pitchFamily="18" charset="0"/>
+                      </a:rPr>
+                      <m:t>=−</m:t>
+                    </m:r>
+                    <m:sSubSup>
+                      <m:sSubSupPr>
+                        <m:ctrlPr>
+                          <a:rPr lang="en-US" b="0" i="1" dirty="0" smtClean="0">
+                            <a:solidFill>
+                              <a:schemeClr val="tx1"/>
+                            </a:solidFill>
+                            <a:latin typeface="Cambria Math" panose="02040503050406030204" pitchFamily="18" charset="0"/>
+                          </a:rPr>
+                        </m:ctrlPr>
+                      </m:sSubSupPr>
+                      <m:e>
+                        <m:r>
+                          <a:rPr lang="en-US" b="0" i="1" dirty="0" smtClean="0">
+                            <a:solidFill>
+                              <a:schemeClr val="tx1"/>
+                            </a:solidFill>
+                            <a:latin typeface="Cambria Math" panose="02040503050406030204" pitchFamily="18" charset="0"/>
+                          </a:rPr>
+                          <m:t>𝜔</m:t>
+                        </m:r>
+                      </m:e>
+                      <m:sub>
+                        <m:r>
+                          <a:rPr lang="en-US" b="0" i="1" dirty="0" smtClean="0">
+                            <a:solidFill>
+                              <a:schemeClr val="tx1"/>
+                            </a:solidFill>
+                            <a:latin typeface="Cambria Math" panose="02040503050406030204" pitchFamily="18" charset="0"/>
+                          </a:rPr>
+                          <m:t>0</m:t>
+                        </m:r>
+                      </m:sub>
+                      <m:sup>
+                        <m:r>
+                          <a:rPr lang="en-US" b="0" i="1" dirty="0" smtClean="0">
+                            <a:solidFill>
+                              <a:schemeClr val="tx1"/>
+                            </a:solidFill>
+                            <a:latin typeface="Cambria Math" panose="02040503050406030204" pitchFamily="18" charset="0"/>
+                          </a:rPr>
+                          <m:t>2</m:t>
+                        </m:r>
+                      </m:sup>
+                    </m:sSubSup>
+                    <m:r>
+                      <m:rPr>
+                        <m:nor/>
+                      </m:rPr>
+                      <a:rPr lang="en-US" b="0" i="0" dirty="0" smtClean="0">
+                        <a:solidFill>
+                          <a:schemeClr val="tx1"/>
+                        </a:solidFill>
+                        <a:latin typeface="Cambria Math" panose="02040503050406030204" pitchFamily="18" charset="0"/>
+                      </a:rPr>
+                      <m:t>sin</m:t>
+                    </m:r>
+                    <m:d>
+                      <m:dPr>
+                        <m:ctrlPr>
+                          <a:rPr lang="en-US" b="0" i="1" dirty="0" smtClean="0">
+                            <a:solidFill>
+                              <a:schemeClr val="tx1"/>
+                            </a:solidFill>
+                            <a:latin typeface="Cambria Math" panose="02040503050406030204" pitchFamily="18" charset="0"/>
+                          </a:rPr>
+                        </m:ctrlPr>
+                      </m:dPr>
+                      <m:e>
+                        <m:r>
+                          <a:rPr lang="en-US" b="0" i="1" dirty="0" smtClean="0">
+                            <a:solidFill>
+                              <a:schemeClr val="tx1"/>
+                            </a:solidFill>
+                            <a:latin typeface="Cambria Math" panose="02040503050406030204" pitchFamily="18" charset="0"/>
+                          </a:rPr>
+                          <m:t>𝜙</m:t>
+                        </m:r>
+                      </m:e>
+                    </m:d>
+                    <m:r>
+                      <a:rPr lang="en-US" b="0" i="1" dirty="0" smtClean="0">
+                        <a:solidFill>
+                          <a:schemeClr val="tx1"/>
+                        </a:solidFill>
+                        <a:latin typeface="Cambria Math" panose="02040503050406030204" pitchFamily="18" charset="0"/>
+                      </a:rPr>
+                      <m:t>−</m:t>
+                    </m:r>
+                    <m:r>
+                      <a:rPr lang="en-US" i="1">
+                        <a:solidFill>
+                          <a:schemeClr val="tx1"/>
+                        </a:solidFill>
+                        <a:latin typeface="Cambria Math" panose="02040503050406030204" pitchFamily="18" charset="0"/>
+                      </a:rPr>
+                      <m:t>2</m:t>
+                    </m:r>
+                    <m:sSub>
+                      <m:sSubPr>
+                        <m:ctrlPr>
+                          <a:rPr lang="en-US" i="1">
+                            <a:solidFill>
+                              <a:schemeClr val="tx1"/>
+                            </a:solidFill>
+                            <a:latin typeface="Cambria Math" panose="02040503050406030204" pitchFamily="18" charset="0"/>
+                          </a:rPr>
+                        </m:ctrlPr>
+                      </m:sSubPr>
+                      <m:e>
+                        <m:r>
+                          <a:rPr lang="en-US" i="1">
+                            <a:solidFill>
+                              <a:schemeClr val="tx1"/>
+                            </a:solidFill>
+                            <a:latin typeface="Cambria Math" panose="02040503050406030204" pitchFamily="18" charset="0"/>
+                          </a:rPr>
+                          <m:t>𝜔</m:t>
+                        </m:r>
+                      </m:e>
+                      <m:sub>
+                        <m:r>
+                          <a:rPr lang="en-US" i="1">
+                            <a:solidFill>
+                              <a:schemeClr val="tx1"/>
+                            </a:solidFill>
+                            <a:latin typeface="Cambria Math" panose="02040503050406030204" pitchFamily="18" charset="0"/>
+                          </a:rPr>
+                          <m:t>0</m:t>
+                        </m:r>
+                      </m:sub>
+                    </m:sSub>
+                    <m:r>
+                      <a:rPr lang="en-US" i="1">
+                        <a:solidFill>
+                          <a:schemeClr val="tx1"/>
+                        </a:solidFill>
+                        <a:latin typeface="Cambria Math" panose="02040503050406030204" pitchFamily="18" charset="0"/>
+                      </a:rPr>
+                      <m:t>𝜒</m:t>
+                    </m:r>
+                    <m:acc>
+                      <m:accPr>
+                        <m:chr m:val="̇"/>
+                        <m:ctrlPr>
+                          <a:rPr lang="en-US" b="0" i="1" dirty="0" smtClean="0">
+                            <a:solidFill>
+                              <a:schemeClr val="tx1"/>
+                            </a:solidFill>
+                            <a:latin typeface="Cambria Math" panose="02040503050406030204" pitchFamily="18" charset="0"/>
+                          </a:rPr>
+                        </m:ctrlPr>
+                      </m:accPr>
+                      <m:e>
+                        <m:r>
+                          <a:rPr lang="en-US" b="0" i="1" dirty="0" smtClean="0">
+                            <a:solidFill>
+                              <a:schemeClr val="tx1"/>
+                            </a:solidFill>
+                            <a:latin typeface="Cambria Math" panose="02040503050406030204" pitchFamily="18" charset="0"/>
+                          </a:rPr>
+                          <m:t>𝜙</m:t>
+                        </m:r>
+                      </m:e>
+                    </m:acc>
+                    <m:r>
+                      <a:rPr lang="en-US" b="0" i="1" dirty="0" smtClean="0">
+                        <a:solidFill>
+                          <a:schemeClr val="tx1"/>
+                        </a:solidFill>
+                        <a:latin typeface="Cambria Math" panose="02040503050406030204" pitchFamily="18" charset="0"/>
+                      </a:rPr>
+                      <m:t>  </m:t>
+                    </m:r>
+                    <m:d>
+                      <m:dPr>
+                        <m:ctrlPr>
+                          <a:rPr lang="en-US" b="0" i="1" dirty="0" smtClean="0">
+                            <a:solidFill>
+                              <a:schemeClr val="tx1"/>
+                            </a:solidFill>
+                            <a:latin typeface="Cambria Math" panose="02040503050406030204" pitchFamily="18" charset="0"/>
+                          </a:rPr>
+                        </m:ctrlPr>
+                      </m:dPr>
+                      <m:e>
+                        <m:r>
+                          <a:rPr lang="en-US" b="0" i="1" dirty="0" smtClean="0">
+                            <a:solidFill>
+                              <a:schemeClr val="tx1"/>
+                            </a:solidFill>
+                            <a:latin typeface="Cambria Math" panose="02040503050406030204" pitchFamily="18" charset="0"/>
+                          </a:rPr>
+                          <m:t>2</m:t>
+                        </m:r>
+                      </m:e>
+                    </m:d>
+                  </m:oMath>
                 </a14:m>
                 <a:br>
-                  <a:rPr lang="en-US" sz="2800" i="1" dirty="0">
+                  <a:rPr lang="en-US" i="1" dirty="0">
+                    <a:solidFill>
+                      <a:schemeClr val="tx1"/>
+                    </a:solidFill>
                     <a:latin typeface="Cambria Math" panose="02040503050406030204" pitchFamily="18" charset="0"/>
                   </a:rPr>
                 </a:br>
-                <a:endParaRPr lang="en-US" sz="2800" i="1" dirty="0">
+                <a:endParaRPr lang="en-US" i="1" dirty="0">
+                  <a:solidFill>
+                    <a:schemeClr val="tx1"/>
+                  </a:solidFill>
                   <a:latin typeface="Cambria Math" panose="02040503050406030204" pitchFamily="18" charset="0"/>
                 </a:endParaRPr>
               </a:p>
@@ -18191,7 +18693,10 @@
                     <a:spcPct val="100000"/>
                   </a:lnSpc>
                 </a:pPr>
-                <a:endParaRPr lang="en-US" sz="2800" i="1" dirty="0">
+                <a:endParaRPr lang="en-US" i="1" dirty="0">
+                  <a:solidFill>
+                    <a:schemeClr val="tx1"/>
+                  </a:solidFill>
                   <a:latin typeface="Cambria Math" panose="02040503050406030204" pitchFamily="18" charset="0"/>
                 </a:endParaRPr>
               </a:p>
@@ -18201,7 +18706,10 @@
                     <a:spcPct val="100000"/>
                   </a:lnSpc>
                 </a:pPr>
-                <a:endParaRPr lang="en-US" sz="2800" i="1" dirty="0">
+                <a:endParaRPr lang="en-US" sz="2800" dirty="0">
+                  <a:solidFill>
+                    <a:schemeClr val="tx1"/>
+                  </a:solidFill>
                   <a:latin typeface="Cambria Math" panose="02040503050406030204" pitchFamily="18" charset="0"/>
                 </a:endParaRPr>
               </a:p>
@@ -18214,272 +18722,356 @@
                   <a:buAutoNum type="romanUcPeriod" startAt="3"/>
                 </a:pPr>
                 <a:r>
-                  <a:rPr lang="en-US" dirty="0">
+                  <a:rPr lang="en-US" sz="2800" dirty="0">
+                    <a:solidFill>
+                      <a:schemeClr val="tx1"/>
+                    </a:solidFill>
                     <a:latin typeface="Cambria Math" panose="02040503050406030204" pitchFamily="18" charset="0"/>
                   </a:rPr>
                   <a:t>Chaotic Oscillator:</a:t>
                 </a:r>
                 <a:br>
-                  <a:rPr lang="en-US" dirty="0">
+                  <a:rPr lang="en-US" sz="2800" dirty="0">
+                    <a:solidFill>
+                      <a:schemeClr val="tx1"/>
+                    </a:solidFill>
                     <a:latin typeface="Cambria Math" panose="02040503050406030204" pitchFamily="18" charset="0"/>
                   </a:rPr>
                 </a:br>
+                <a14:m>
+                  <m:oMath xmlns:m="http://schemas.openxmlformats.org/officeDocument/2006/math">
+                    <m:acc>
+                      <m:accPr>
+                        <m:chr m:val="̈"/>
+                        <m:ctrlPr>
+                          <a:rPr lang="en-US" i="1">
+                            <a:solidFill>
+                              <a:schemeClr val="tx1"/>
+                            </a:solidFill>
+                            <a:latin typeface="Cambria Math" panose="02040503050406030204" pitchFamily="18" charset="0"/>
+                          </a:rPr>
+                        </m:ctrlPr>
+                      </m:accPr>
+                      <m:e>
+                        <m:r>
+                          <a:rPr lang="en-US" i="1">
+                            <a:solidFill>
+                              <a:schemeClr val="tx1"/>
+                            </a:solidFill>
+                            <a:latin typeface="Cambria Math" panose="02040503050406030204" pitchFamily="18" charset="0"/>
+                          </a:rPr>
+                          <m:t>𝜙</m:t>
+                        </m:r>
+                      </m:e>
+                    </m:acc>
+                    <m:r>
+                      <a:rPr lang="en-US" i="1">
+                        <a:solidFill>
+                          <a:schemeClr val="tx1"/>
+                        </a:solidFill>
+                        <a:latin typeface="Cambria Math" panose="02040503050406030204" pitchFamily="18" charset="0"/>
+                      </a:rPr>
+                      <m:t>=−</m:t>
+                    </m:r>
+                    <m:r>
+                      <m:rPr>
+                        <m:nor/>
+                      </m:rPr>
+                      <a:rPr lang="en-US">
+                        <a:solidFill>
+                          <a:schemeClr val="tx1"/>
+                        </a:solidFill>
+                        <a:latin typeface="Cambria Math" panose="02040503050406030204" pitchFamily="18" charset="0"/>
+                      </a:rPr>
+                      <m:t>sin</m:t>
+                    </m:r>
+                    <m:d>
+                      <m:dPr>
+                        <m:ctrlPr>
+                          <a:rPr lang="en-US" i="1">
+                            <a:solidFill>
+                              <a:schemeClr val="tx1"/>
+                            </a:solidFill>
+                            <a:latin typeface="Cambria Math" panose="02040503050406030204" pitchFamily="18" charset="0"/>
+                          </a:rPr>
+                        </m:ctrlPr>
+                      </m:dPr>
+                      <m:e>
+                        <m:r>
+                          <a:rPr lang="en-US" i="1">
+                            <a:solidFill>
+                              <a:schemeClr val="tx1"/>
+                            </a:solidFill>
+                            <a:latin typeface="Cambria Math" panose="02040503050406030204" pitchFamily="18" charset="0"/>
+                          </a:rPr>
+                          <m:t>𝜙</m:t>
+                        </m:r>
+                      </m:e>
+                    </m:d>
+                    <m:d>
+                      <m:dPr>
+                        <m:ctrlPr>
+                          <a:rPr lang="en-US" b="0" i="1" smtClean="0">
+                            <a:solidFill>
+                              <a:schemeClr val="tx1"/>
+                            </a:solidFill>
+                            <a:latin typeface="Cambria Math" panose="02040503050406030204" pitchFamily="18" charset="0"/>
+                          </a:rPr>
+                        </m:ctrlPr>
+                      </m:dPr>
+                      <m:e>
+                        <m:sSubSup>
+                          <m:sSubSupPr>
+                            <m:ctrlPr>
+                              <a:rPr lang="en-US" i="1">
+                                <a:solidFill>
+                                  <a:schemeClr val="tx1"/>
+                                </a:solidFill>
+                                <a:latin typeface="Cambria Math" panose="02040503050406030204" pitchFamily="18" charset="0"/>
+                              </a:rPr>
+                            </m:ctrlPr>
+                          </m:sSubSupPr>
+                          <m:e>
+                            <m:r>
+                              <a:rPr lang="en-US" i="1">
+                                <a:solidFill>
+                                  <a:schemeClr val="tx1"/>
+                                </a:solidFill>
+                                <a:latin typeface="Cambria Math" panose="02040503050406030204" pitchFamily="18" charset="0"/>
+                              </a:rPr>
+                              <m:t>𝜔</m:t>
+                            </m:r>
+                          </m:e>
+                          <m:sub>
+                            <m:r>
+                              <a:rPr lang="en-US" i="1">
+                                <a:solidFill>
+                                  <a:schemeClr val="tx1"/>
+                                </a:solidFill>
+                                <a:latin typeface="Cambria Math" panose="02040503050406030204" pitchFamily="18" charset="0"/>
+                              </a:rPr>
+                              <m:t>0</m:t>
+                            </m:r>
+                          </m:sub>
+                          <m:sup>
+                            <m:r>
+                              <a:rPr lang="en-US" i="1">
+                                <a:solidFill>
+                                  <a:schemeClr val="tx1"/>
+                                </a:solidFill>
+                                <a:latin typeface="Cambria Math" panose="02040503050406030204" pitchFamily="18" charset="0"/>
+                              </a:rPr>
+                              <m:t>2</m:t>
+                            </m:r>
+                          </m:sup>
+                        </m:sSubSup>
+                        <m:r>
+                          <a:rPr lang="en-US" b="0" i="1" smtClean="0">
+                            <a:solidFill>
+                              <a:schemeClr val="tx1"/>
+                            </a:solidFill>
+                            <a:latin typeface="Cambria Math" panose="02040503050406030204" pitchFamily="18" charset="0"/>
+                          </a:rPr>
+                          <m:t>+</m:t>
+                        </m:r>
+                        <m:r>
+                          <a:rPr lang="en-US" i="1">
+                            <a:solidFill>
+                              <a:schemeClr val="tx1"/>
+                            </a:solidFill>
+                            <a:latin typeface="Cambria Math" panose="02040503050406030204" pitchFamily="18" charset="0"/>
+                          </a:rPr>
+                          <m:t>𝜂</m:t>
+                        </m:r>
+                        <m:r>
+                          <m:rPr>
+                            <m:nor/>
+                          </m:rPr>
+                          <a:rPr lang="en-US">
+                            <a:solidFill>
+                              <a:schemeClr val="tx1"/>
+                            </a:solidFill>
+                            <a:latin typeface="Cambria Math" panose="02040503050406030204" pitchFamily="18" charset="0"/>
+                          </a:rPr>
+                          <m:t>cos</m:t>
+                        </m:r>
+                        <m:d>
+                          <m:dPr>
+                            <m:ctrlPr>
+                              <a:rPr lang="en-US" i="1">
+                                <a:solidFill>
+                                  <a:schemeClr val="tx1"/>
+                                </a:solidFill>
+                                <a:latin typeface="Cambria Math" panose="02040503050406030204" pitchFamily="18" charset="0"/>
+                              </a:rPr>
+                            </m:ctrlPr>
+                          </m:dPr>
+                          <m:e>
+                            <m:sSub>
+                              <m:sSubPr>
+                                <m:ctrlPr>
+                                  <a:rPr lang="en-US" i="1">
+                                    <a:solidFill>
+                                      <a:schemeClr val="tx1"/>
+                                    </a:solidFill>
+                                    <a:latin typeface="Cambria Math" panose="02040503050406030204" pitchFamily="18" charset="0"/>
+                                  </a:rPr>
+                                </m:ctrlPr>
+                              </m:sSubPr>
+                              <m:e>
+                                <m:r>
+                                  <a:rPr lang="en-US" i="1">
+                                    <a:solidFill>
+                                      <a:schemeClr val="tx1"/>
+                                    </a:solidFill>
+                                    <a:latin typeface="Cambria Math" panose="02040503050406030204" pitchFamily="18" charset="0"/>
+                                  </a:rPr>
+                                  <m:t>𝜔</m:t>
+                                </m:r>
+                              </m:e>
+                              <m:sub>
+                                <m:r>
+                                  <a:rPr lang="en-US" i="1">
+                                    <a:solidFill>
+                                      <a:schemeClr val="tx1"/>
+                                    </a:solidFill>
+                                    <a:latin typeface="Cambria Math" panose="02040503050406030204" pitchFamily="18" charset="0"/>
+                                  </a:rPr>
+                                  <m:t>𝑑</m:t>
+                                </m:r>
+                              </m:sub>
+                            </m:sSub>
+                            <m:r>
+                              <a:rPr lang="en-US" i="1">
+                                <a:solidFill>
+                                  <a:schemeClr val="tx1"/>
+                                </a:solidFill>
+                                <a:latin typeface="Cambria Math" panose="02040503050406030204" pitchFamily="18" charset="0"/>
+                              </a:rPr>
+                              <m:t>𝑡</m:t>
+                            </m:r>
+                            <m:r>
+                              <a:rPr lang="en-US" i="1">
+                                <a:solidFill>
+                                  <a:schemeClr val="tx1"/>
+                                </a:solidFill>
+                                <a:latin typeface="Cambria Math" panose="02040503050406030204" pitchFamily="18" charset="0"/>
+                              </a:rPr>
+                              <m:t>+</m:t>
+                            </m:r>
+                            <m:r>
+                              <a:rPr lang="en-US" i="1">
+                                <a:solidFill>
+                                  <a:schemeClr val="tx1"/>
+                                </a:solidFill>
+                                <a:latin typeface="Cambria Math" panose="02040503050406030204" pitchFamily="18" charset="0"/>
+                              </a:rPr>
+                              <m:t>𝛿</m:t>
+                            </m:r>
+                          </m:e>
+                        </m:d>
+                      </m:e>
+                    </m:d>
+                    <m:r>
+                      <a:rPr lang="en-US" b="0" i="1" smtClean="0">
+                        <a:solidFill>
+                          <a:schemeClr val="tx1"/>
+                        </a:solidFill>
+                        <a:latin typeface="Cambria Math" panose="02040503050406030204" pitchFamily="18" charset="0"/>
+                      </a:rPr>
+                      <m:t>−</m:t>
+                    </m:r>
+                    <m:r>
+                      <a:rPr lang="en-US" i="1">
+                        <a:solidFill>
+                          <a:schemeClr val="tx1"/>
+                        </a:solidFill>
+                        <a:latin typeface="Cambria Math" panose="02040503050406030204" pitchFamily="18" charset="0"/>
+                      </a:rPr>
+                      <m:t>2</m:t>
+                    </m:r>
+                    <m:sSub>
+                      <m:sSubPr>
+                        <m:ctrlPr>
+                          <a:rPr lang="en-US" i="1">
+                            <a:solidFill>
+                              <a:schemeClr val="tx1"/>
+                            </a:solidFill>
+                            <a:latin typeface="Cambria Math" panose="02040503050406030204" pitchFamily="18" charset="0"/>
+                          </a:rPr>
+                        </m:ctrlPr>
+                      </m:sSubPr>
+                      <m:e>
+                        <m:r>
+                          <a:rPr lang="en-US" i="1">
+                            <a:solidFill>
+                              <a:schemeClr val="tx1"/>
+                            </a:solidFill>
+                            <a:latin typeface="Cambria Math" panose="02040503050406030204" pitchFamily="18" charset="0"/>
+                          </a:rPr>
+                          <m:t>𝜔</m:t>
+                        </m:r>
+                      </m:e>
+                      <m:sub>
+                        <m:r>
+                          <a:rPr lang="en-US" i="1">
+                            <a:solidFill>
+                              <a:schemeClr val="tx1"/>
+                            </a:solidFill>
+                            <a:latin typeface="Cambria Math" panose="02040503050406030204" pitchFamily="18" charset="0"/>
+                          </a:rPr>
+                          <m:t>0</m:t>
+                        </m:r>
+                      </m:sub>
+                    </m:sSub>
+                    <m:r>
+                      <a:rPr lang="en-US" i="1">
+                        <a:solidFill>
+                          <a:schemeClr val="tx1"/>
+                        </a:solidFill>
+                        <a:latin typeface="Cambria Math" panose="02040503050406030204" pitchFamily="18" charset="0"/>
+                      </a:rPr>
+                      <m:t>𝜒</m:t>
+                    </m:r>
+                    <m:acc>
+                      <m:accPr>
+                        <m:chr m:val="̇"/>
+                        <m:ctrlPr>
+                          <a:rPr lang="en-US" b="0" i="1" smtClean="0">
+                            <a:solidFill>
+                              <a:schemeClr val="tx1"/>
+                            </a:solidFill>
+                            <a:latin typeface="Cambria Math" panose="02040503050406030204" pitchFamily="18" charset="0"/>
+                          </a:rPr>
+                        </m:ctrlPr>
+                      </m:accPr>
+                      <m:e>
+                        <m:r>
+                          <a:rPr lang="en-US" b="0" i="1" smtClean="0">
+                            <a:solidFill>
+                              <a:schemeClr val="tx1"/>
+                            </a:solidFill>
+                            <a:latin typeface="Cambria Math" panose="02040503050406030204" pitchFamily="18" charset="0"/>
+                          </a:rPr>
+                          <m:t>𝜙</m:t>
+                        </m:r>
+                      </m:e>
+                    </m:acc>
+                    <m:r>
+                      <a:rPr lang="en-US" b="0" i="1" smtClean="0">
+                        <a:solidFill>
+                          <a:schemeClr val="tx1"/>
+                        </a:solidFill>
+                        <a:latin typeface="Cambria Math" panose="02040503050406030204" pitchFamily="18" charset="0"/>
+                      </a:rPr>
+                      <m:t> (3)</m:t>
+                    </m:r>
+                  </m:oMath>
+                </a14:m>
                 <a:endParaRPr lang="en-US" dirty="0">
-                  <a:latin typeface="Cambria Math" panose="02040503050406030204" pitchFamily="18" charset="0"/>
-                </a:endParaRPr>
-              </a:p>
-              <a:p>
-                <a:pPr algn="r">
-                  <a:lnSpc>
-                    <a:spcPct val="100000"/>
-                  </a:lnSpc>
-                </a:pPr>
-                <a14:m>
-                  <m:oMathPara xmlns:m="http://schemas.openxmlformats.org/officeDocument/2006/math">
-                    <m:oMathParaPr>
-                      <m:jc m:val="right"/>
-                    </m:oMathParaPr>
-                    <m:oMath xmlns:m="http://schemas.openxmlformats.org/officeDocument/2006/math">
-                      <m:acc>
-                        <m:accPr>
-                          <m:chr m:val="̈"/>
-                          <m:ctrlPr>
-                            <a:rPr lang="en-US" sz="2800" i="1">
-                              <a:latin typeface="Cambria Math" panose="02040503050406030204" pitchFamily="18" charset="0"/>
-                            </a:rPr>
-                          </m:ctrlPr>
-                        </m:accPr>
-                        <m:e>
-                          <m:r>
-                            <a:rPr lang="en-US" sz="2800" i="1">
-                              <a:latin typeface="Cambria Math" panose="02040503050406030204" pitchFamily="18" charset="0"/>
-                            </a:rPr>
-                            <m:t>𝜙</m:t>
-                          </m:r>
-                        </m:e>
-                      </m:acc>
-                      <m:r>
-                        <a:rPr lang="en-US" sz="2800" i="1">
-                          <a:latin typeface="Cambria Math" panose="02040503050406030204" pitchFamily="18" charset="0"/>
-                        </a:rPr>
-                        <m:t>=−</m:t>
-                      </m:r>
-                      <m:r>
-                        <m:rPr>
-                          <m:nor/>
-                        </m:rPr>
-                        <a:rPr lang="en-US" sz="2800">
-                          <a:latin typeface="Cambria Math" panose="02040503050406030204" pitchFamily="18" charset="0"/>
-                        </a:rPr>
-                        <m:t>sin</m:t>
-                      </m:r>
-                      <m:d>
-                        <m:dPr>
-                          <m:ctrlPr>
-                            <a:rPr lang="en-US" sz="2800" i="1">
-                              <a:latin typeface="Cambria Math" panose="02040503050406030204" pitchFamily="18" charset="0"/>
-                            </a:rPr>
-                          </m:ctrlPr>
-                        </m:dPr>
-                        <m:e>
-                          <m:r>
-                            <a:rPr lang="en-US" sz="2800" i="1">
-                              <a:latin typeface="Cambria Math" panose="02040503050406030204" pitchFamily="18" charset="0"/>
-                            </a:rPr>
-                            <m:t>𝜙</m:t>
-                          </m:r>
-                        </m:e>
-                      </m:d>
-                      <m:d>
-                        <m:dPr>
-                          <m:ctrlPr>
-                            <a:rPr lang="en-US" sz="2800" b="0" i="1" smtClean="0">
-                              <a:latin typeface="Cambria Math" panose="02040503050406030204" pitchFamily="18" charset="0"/>
-                            </a:rPr>
-                          </m:ctrlPr>
-                        </m:dPr>
-                        <m:e>
-                          <m:sSubSup>
-                            <m:sSubSupPr>
-                              <m:ctrlPr>
-                                <a:rPr lang="en-US" sz="2800" i="1">
-                                  <a:latin typeface="Cambria Math" panose="02040503050406030204" pitchFamily="18" charset="0"/>
-                                </a:rPr>
-                              </m:ctrlPr>
-                            </m:sSubSupPr>
-                            <m:e>
-                              <m:r>
-                                <a:rPr lang="en-US" sz="2800" i="1">
-                                  <a:latin typeface="Cambria Math" panose="02040503050406030204" pitchFamily="18" charset="0"/>
-                                </a:rPr>
-                                <m:t>𝜔</m:t>
-                              </m:r>
-                            </m:e>
-                            <m:sub>
-                              <m:r>
-                                <a:rPr lang="en-US" sz="2800" i="1">
-                                  <a:latin typeface="Cambria Math" panose="02040503050406030204" pitchFamily="18" charset="0"/>
-                                </a:rPr>
-                                <m:t>0</m:t>
-                              </m:r>
-                            </m:sub>
-                            <m:sup>
-                              <m:r>
-                                <a:rPr lang="en-US" sz="2800" i="1">
-                                  <a:latin typeface="Cambria Math" panose="02040503050406030204" pitchFamily="18" charset="0"/>
-                                </a:rPr>
-                                <m:t>2</m:t>
-                              </m:r>
-                            </m:sup>
-                          </m:sSubSup>
-                          <m:r>
-                            <a:rPr lang="en-US" sz="2800" b="0" i="1" smtClean="0">
-                              <a:latin typeface="Cambria Math" panose="02040503050406030204" pitchFamily="18" charset="0"/>
-                            </a:rPr>
-                            <m:t>+</m:t>
-                          </m:r>
-                          <m:r>
-                            <a:rPr lang="en-US" sz="2800" i="1">
-                              <a:latin typeface="Cambria Math" panose="02040503050406030204" pitchFamily="18" charset="0"/>
-                            </a:rPr>
-                            <m:t>𝜂</m:t>
-                          </m:r>
-                          <m:r>
-                            <m:rPr>
-                              <m:nor/>
-                            </m:rPr>
-                            <a:rPr lang="en-US" sz="2800">
-                              <a:latin typeface="Cambria Math" panose="02040503050406030204" pitchFamily="18" charset="0"/>
-                            </a:rPr>
-                            <m:t>cos</m:t>
-                          </m:r>
-                          <m:d>
-                            <m:dPr>
-                              <m:ctrlPr>
-                                <a:rPr lang="en-US" sz="2800" i="1">
-                                  <a:latin typeface="Cambria Math" panose="02040503050406030204" pitchFamily="18" charset="0"/>
-                                </a:rPr>
-                              </m:ctrlPr>
-                            </m:dPr>
-                            <m:e>
-                              <m:sSub>
-                                <m:sSubPr>
-                                  <m:ctrlPr>
-                                    <a:rPr lang="en-US" sz="2800" i="1">
-                                      <a:latin typeface="Cambria Math" panose="02040503050406030204" pitchFamily="18" charset="0"/>
-                                    </a:rPr>
-                                  </m:ctrlPr>
-                                </m:sSubPr>
-                                <m:e>
-                                  <m:r>
-                                    <a:rPr lang="en-US" sz="2800" i="1">
-                                      <a:latin typeface="Cambria Math" panose="02040503050406030204" pitchFamily="18" charset="0"/>
-                                    </a:rPr>
-                                    <m:t>𝜔</m:t>
-                                  </m:r>
-                                </m:e>
-                                <m:sub>
-                                  <m:r>
-                                    <a:rPr lang="en-US" sz="2800" i="1">
-                                      <a:latin typeface="Cambria Math" panose="02040503050406030204" pitchFamily="18" charset="0"/>
-                                    </a:rPr>
-                                    <m:t>𝑑</m:t>
-                                  </m:r>
-                                </m:sub>
-                              </m:sSub>
-                              <m:r>
-                                <a:rPr lang="en-US" sz="2800" i="1">
-                                  <a:latin typeface="Cambria Math" panose="02040503050406030204" pitchFamily="18" charset="0"/>
-                                </a:rPr>
-                                <m:t>𝑡</m:t>
-                              </m:r>
-                              <m:r>
-                                <a:rPr lang="en-US" sz="2800" i="1">
-                                  <a:latin typeface="Cambria Math" panose="02040503050406030204" pitchFamily="18" charset="0"/>
-                                </a:rPr>
-                                <m:t>+</m:t>
-                              </m:r>
-                              <m:r>
-                                <a:rPr lang="en-US" sz="2800" i="1">
-                                  <a:latin typeface="Cambria Math" panose="02040503050406030204" pitchFamily="18" charset="0"/>
-                                </a:rPr>
-                                <m:t>𝛿</m:t>
-                              </m:r>
-                            </m:e>
-                          </m:d>
-                        </m:e>
-                      </m:d>
-                      <m:r>
-                        <a:rPr lang="en-US" sz="2800" b="0" i="1" smtClean="0">
-                          <a:latin typeface="Cambria Math" panose="02040503050406030204" pitchFamily="18" charset="0"/>
-                        </a:rPr>
-                        <m:t>−</m:t>
-                      </m:r>
-                      <m:r>
-                        <a:rPr lang="en-US" sz="2800" i="1">
-                          <a:latin typeface="Cambria Math" panose="02040503050406030204" pitchFamily="18" charset="0"/>
-                        </a:rPr>
-                        <m:t>2</m:t>
-                      </m:r>
-                      <m:sSub>
-                        <m:sSubPr>
-                          <m:ctrlPr>
-                            <a:rPr lang="en-US" sz="2800" i="1">
-                              <a:latin typeface="Cambria Math" panose="02040503050406030204" pitchFamily="18" charset="0"/>
-                            </a:rPr>
-                          </m:ctrlPr>
-                        </m:sSubPr>
-                        <m:e>
-                          <m:r>
-                            <a:rPr lang="en-US" sz="2800" i="1">
-                              <a:latin typeface="Cambria Math" panose="02040503050406030204" pitchFamily="18" charset="0"/>
-                            </a:rPr>
-                            <m:t>𝜔</m:t>
-                          </m:r>
-                        </m:e>
-                        <m:sub>
-                          <m:r>
-                            <a:rPr lang="en-US" sz="2800" i="1">
-                              <a:latin typeface="Cambria Math" panose="02040503050406030204" pitchFamily="18" charset="0"/>
-                            </a:rPr>
-                            <m:t>0</m:t>
-                          </m:r>
-                        </m:sub>
-                      </m:sSub>
-                      <m:r>
-                        <a:rPr lang="en-US" sz="2800" i="1">
-                          <a:latin typeface="Cambria Math" panose="02040503050406030204" pitchFamily="18" charset="0"/>
-                        </a:rPr>
-                        <m:t>𝜒</m:t>
-                      </m:r>
-                      <m:acc>
-                        <m:accPr>
-                          <m:chr m:val="̇"/>
-                          <m:ctrlPr>
-                            <a:rPr lang="en-US" sz="2800" b="0" i="1" smtClean="0">
-                              <a:latin typeface="Cambria Math" panose="02040503050406030204" pitchFamily="18" charset="0"/>
-                            </a:rPr>
-                          </m:ctrlPr>
-                        </m:accPr>
-                        <m:e>
-                          <m:r>
-                            <a:rPr lang="en-US" sz="2800" b="0" i="1" smtClean="0">
-                              <a:latin typeface="Cambria Math" panose="02040503050406030204" pitchFamily="18" charset="0"/>
-                            </a:rPr>
-                            <m:t>𝜙</m:t>
-                          </m:r>
-                        </m:e>
-                      </m:acc>
-                      <m:r>
-                        <a:rPr lang="en-US" sz="2800" b="0" i="1" smtClean="0">
-                          <a:latin typeface="Cambria Math" panose="02040503050406030204" pitchFamily="18" charset="0"/>
-                        </a:rPr>
-                        <m:t> (3)</m:t>
-                      </m:r>
-                    </m:oMath>
-                  </m:oMathPara>
-                </a14:m>
-                <a:endParaRPr lang="en-US" sz="2800" dirty="0">
+                  <a:solidFill>
+                    <a:schemeClr val="tx1"/>
+                  </a:solidFill>
                   <a:latin typeface="Cambria Math" panose="02040503050406030204" pitchFamily="18" charset="0"/>
                 </a:endParaRPr>
               </a:p>
@@ -18493,9 +19085,7 @@
                 </a:pPr>
                 <a:endParaRPr lang="en-US" dirty="0">
                   <a:solidFill>
-                    <a:schemeClr val="accent5">
-                      <a:lumMod val="50000"/>
-                    </a:schemeClr>
+                    <a:schemeClr val="tx1"/>
                   </a:solidFill>
                 </a:endParaRPr>
               </a:p>
@@ -18508,9 +19098,7 @@
                 </a:pPr>
                 <a:endParaRPr lang="en-US" dirty="0">
                   <a:solidFill>
-                    <a:schemeClr val="accent5">
-                      <a:lumMod val="50000"/>
-                    </a:schemeClr>
+                    <a:schemeClr val="tx1"/>
                   </a:solidFill>
                 </a:endParaRPr>
               </a:p>
@@ -18523,9 +19111,7 @@
                 </a:pPr>
                 <a:endParaRPr lang="en-US" dirty="0">
                   <a:solidFill>
-                    <a:schemeClr val="accent5">
-                      <a:lumMod val="50000"/>
-                    </a:schemeClr>
+                    <a:schemeClr val="tx1"/>
                   </a:solidFill>
                 </a:endParaRPr>
               </a:p>
@@ -18552,12 +19138,12 @@
             <p:spPr>
               <a:xfrm>
                 <a:off x="459674" y="14951552"/>
-                <a:ext cx="10056813" cy="15956718"/>
+                <a:ext cx="10056813" cy="16297966"/>
               </a:xfrm>
               <a:blipFill>
                 <a:blip r:embed="rId7"/>
                 <a:stretch>
-                  <a:fillRect/>
+                  <a:fillRect r="-505"/>
                 </a:stretch>
               </a:blipFill>
             </p:spPr>
@@ -18650,7 +19236,12 @@
             <p:ph type="body" sz="quarter" idx="153"/>
           </p:nvPr>
         </p:nvSpPr>
-        <p:spPr/>
+        <p:spPr>
+          <a:noFill/>
+          <a:ln>
+            <a:noFill/>
+          </a:ln>
+        </p:spPr>
         <p:txBody>
           <a:bodyPr>
             <a:normAutofit lnSpcReduction="10000"/>
@@ -18692,7 +19283,7 @@
         </p:blipFill>
         <p:spPr>
           <a:xfrm>
-            <a:off x="10956944" y="8701083"/>
+            <a:off x="10671476" y="8701083"/>
             <a:ext cx="7315200" cy="4864100"/>
           </a:xfrm>
           <a:prstGeom prst="rect">
@@ -18770,6 +19361,9 @@
           <a:prstGeom prst="rect">
             <a:avLst/>
           </a:prstGeom>
+          <a:ln>
+            <a:noFill/>
+          </a:ln>
         </p:spPr>
       </p:pic>
       <p:sp>
@@ -18794,7 +19388,39 @@
           <a:prstGeom prst="rect">
             <a:avLst/>
           </a:prstGeom>
-          <a:noFill/>
+          <a:gradFill flip="none" rotWithShape="1">
+            <a:gsLst>
+              <a:gs pos="0">
+                <a:srgbClr val="FF9300">
+                  <a:tint val="66000"/>
+                  <a:satMod val="160000"/>
+                </a:srgbClr>
+              </a:gs>
+              <a:gs pos="50000">
+                <a:srgbClr val="FF9300">
+                  <a:tint val="44500"/>
+                  <a:satMod val="160000"/>
+                </a:srgbClr>
+              </a:gs>
+              <a:gs pos="100000">
+                <a:srgbClr val="FF9300">
+                  <a:tint val="23500"/>
+                  <a:satMod val="160000"/>
+                </a:srgbClr>
+              </a:gs>
+            </a:gsLst>
+            <a:path path="circle">
+              <a:fillToRect l="50000" t="50000" r="50000" b="50000"/>
+            </a:path>
+            <a:tileRect/>
+          </a:gradFill>
+          <a:ln>
+            <a:solidFill>
+              <a:schemeClr val="accent5">
+                <a:lumMod val="50000"/>
+              </a:schemeClr>
+            </a:solidFill>
+          </a:ln>
         </p:spPr>
         <p:txBody>
           <a:bodyPr vert="horz" lIns="91436" tIns="91436" rIns="91436" bIns="91436" rtlCol="0" anchor="ctr" anchorCtr="0">
@@ -19001,7 +19627,7 @@
             <p:spPr>
               <a:xfrm>
                 <a:off x="11466362" y="15144161"/>
-                <a:ext cx="6829427" cy="1846637"/>
+                <a:ext cx="6829427" cy="2012837"/>
               </a:xfrm>
               <a:prstGeom prst="rect">
                 <a:avLst/>
@@ -19180,7 +19806,11 @@
               <a:p>
                 <a:pPr algn="just"/>
                 <a:r>
-                  <a:rPr lang="en-US" dirty="0"/>
+                  <a:rPr lang="en-US" sz="2800" dirty="0">
+                    <a:solidFill>
+                      <a:schemeClr val="tx1"/>
+                    </a:solidFill>
+                  </a:rPr>
                   <a:t>As the initial displacement is further increased, higher order terms in the </a:t>
                 </a:r>
                 <a14:m>
@@ -19189,25 +19819,37 @@
                       <m:rPr>
                         <m:nor/>
                       </m:rPr>
-                      <a:rPr lang="en-US" b="0" i="0" smtClean="0">
+                      <a:rPr lang="en-US" sz="2800" b="0" i="0" smtClean="0">
+                        <a:solidFill>
+                          <a:schemeClr val="tx1"/>
+                        </a:solidFill>
                         <a:latin typeface="Cambria Math" panose="02040503050406030204" pitchFamily="18" charset="0"/>
                       </a:rPr>
                       <m:t>sin</m:t>
                     </m:r>
                     <m:r>
-                      <a:rPr lang="en-US" b="0" i="1" smtClean="0">
+                      <a:rPr lang="en-US" sz="2800" b="0" i="1" smtClean="0">
+                        <a:solidFill>
+                          <a:schemeClr val="tx1"/>
+                        </a:solidFill>
                         <a:latin typeface="Cambria Math" panose="02040503050406030204" pitchFamily="18" charset="0"/>
                       </a:rPr>
                       <m:t>(</m:t>
                     </m:r>
                     <m:r>
-                      <a:rPr lang="en-US" b="0" i="1" smtClean="0">
+                      <a:rPr lang="en-US" sz="2800" b="0" i="1" smtClean="0">
+                        <a:solidFill>
+                          <a:schemeClr val="tx1"/>
+                        </a:solidFill>
                         <a:latin typeface="Cambria Math" panose="02040503050406030204" pitchFamily="18" charset="0"/>
                       </a:rPr>
                       <m:t>𝜙</m:t>
                     </m:r>
                     <m:r>
-                      <a:rPr lang="en-US" b="0" i="1" smtClean="0">
+                      <a:rPr lang="en-US" sz="2800" b="0" i="1" smtClean="0">
+                        <a:solidFill>
+                          <a:schemeClr val="tx1"/>
+                        </a:solidFill>
                         <a:latin typeface="Cambria Math" panose="02040503050406030204" pitchFamily="18" charset="0"/>
                       </a:rPr>
                       <m:t>)</m:t>
@@ -19215,7 +19857,11 @@
                   </m:oMath>
                 </a14:m>
                 <a:r>
-                  <a:rPr lang="en-US" dirty="0"/>
+                  <a:rPr lang="en-US" sz="2800" dirty="0">
+                    <a:solidFill>
+                      <a:schemeClr val="tx1"/>
+                    </a:solidFill>
+                  </a:rPr>
                   <a:t> term become dominant. While periodic, the behavior is no longer harmonic [].  </a:t>
                 </a:r>
               </a:p>
@@ -19240,7 +19886,7 @@
             <p:spPr>
               <a:xfrm>
                 <a:off x="11466362" y="15144161"/>
-                <a:ext cx="6829427" cy="1846637"/>
+                <a:ext cx="6829427" cy="2012837"/>
               </a:xfrm>
               <a:prstGeom prst="rect">
                 <a:avLst/>
@@ -19269,10 +19915,10 @@
       </mc:AlternateContent>
       <p:pic>
         <p:nvPicPr>
-          <p:cNvPr id="24" name="Picture 23">
+          <p:cNvPr id="34" name="Picture 33">
             <a:extLst>
               <a:ext uri="{FF2B5EF4-FFF2-40B4-BE49-F238E27FC236}">
-                <a16:creationId xmlns:a16="http://schemas.microsoft.com/office/drawing/2014/main" id="{FF958E18-8FD6-9742-BF85-D701FB53040D}"/>
+                <a16:creationId xmlns:a16="http://schemas.microsoft.com/office/drawing/2014/main" id="{ABBDECF5-BDE1-6145-A84F-294830BD9373}"/>
               </a:ext>
             </a:extLst>
           </p:cNvPr>
@@ -19295,79 +19941,7 @@
         </p:blipFill>
         <p:spPr>
           <a:xfrm>
-            <a:off x="17986676" y="17056112"/>
-            <a:ext cx="7315200" cy="4864100"/>
-          </a:xfrm>
-          <a:prstGeom prst="rect">
-            <a:avLst/>
-          </a:prstGeom>
-        </p:spPr>
-      </p:pic>
-      <p:pic>
-        <p:nvPicPr>
-          <p:cNvPr id="32" name="Picture 31">
-            <a:extLst>
-              <a:ext uri="{FF2B5EF4-FFF2-40B4-BE49-F238E27FC236}">
-                <a16:creationId xmlns:a16="http://schemas.microsoft.com/office/drawing/2014/main" id="{59AB2C37-B88E-C846-A4AC-3A2DFBCC2F64}"/>
-              </a:ext>
-            </a:extLst>
-          </p:cNvPr>
-          <p:cNvPicPr>
-            <a:picLocks noChangeAspect="1"/>
-          </p:cNvPicPr>
-          <p:nvPr/>
-        </p:nvPicPr>
-        <p:blipFill>
-          <a:blip r:embed="rId13">
-            <a:extLst>
-              <a:ext uri="{28A0092B-C50C-407E-A947-70E740481C1C}">
-                <a14:useLocalDpi xmlns:a14="http://schemas.microsoft.com/office/drawing/2010/main" val="0"/>
-              </a:ext>
-            </a:extLst>
-          </a:blip>
-          <a:stretch>
-            <a:fillRect/>
-          </a:stretch>
-        </p:blipFill>
-        <p:spPr>
-          <a:xfrm>
-            <a:off x="24863393" y="17064436"/>
-            <a:ext cx="7315200" cy="4864100"/>
-          </a:xfrm>
-          <a:prstGeom prst="rect">
-            <a:avLst/>
-          </a:prstGeom>
-        </p:spPr>
-      </p:pic>
-      <p:pic>
-        <p:nvPicPr>
-          <p:cNvPr id="34" name="Picture 33">
-            <a:extLst>
-              <a:ext uri="{FF2B5EF4-FFF2-40B4-BE49-F238E27FC236}">
-                <a16:creationId xmlns:a16="http://schemas.microsoft.com/office/drawing/2014/main" id="{ABBDECF5-BDE1-6145-A84F-294830BD9373}"/>
-              </a:ext>
-            </a:extLst>
-          </p:cNvPr>
-          <p:cNvPicPr>
-            <a:picLocks noChangeAspect="1"/>
-          </p:cNvPicPr>
-          <p:nvPr/>
-        </p:nvPicPr>
-        <p:blipFill>
-          <a:blip r:embed="rId14">
-            <a:extLst>
-              <a:ext uri="{28A0092B-C50C-407E-A947-70E740481C1C}">
-                <a14:useLocalDpi xmlns:a14="http://schemas.microsoft.com/office/drawing/2010/main" val="0"/>
-              </a:ext>
-            </a:extLst>
-          </a:blip>
-          <a:stretch>
-            <a:fillRect/>
-          </a:stretch>
-        </p:blipFill>
-        <p:spPr>
-          <a:xfrm>
-            <a:off x="-4428" y="27463879"/>
+            <a:off x="62191" y="27774568"/>
             <a:ext cx="7386588" cy="5143832"/>
           </a:xfrm>
           <a:prstGeom prst="rect">
@@ -19392,7 +19966,7 @@
         <p:spPr>
           <a:xfrm>
             <a:off x="18472449" y="15144161"/>
-            <a:ext cx="6829427" cy="1154140"/>
+            <a:ext cx="6829427" cy="1625038"/>
           </a:xfrm>
           <a:prstGeom prst="rect">
             <a:avLst/>
@@ -19571,7 +20145,11 @@
           <a:p>
             <a:pPr algn="just"/>
             <a:r>
-              <a:rPr lang="en-US" dirty="0"/>
+              <a:rPr lang="en-US" sz="2800" dirty="0">
+                <a:solidFill>
+                  <a:schemeClr val="tx1"/>
+                </a:solidFill>
+              </a:rPr>
               <a:t>The phase space orbits now become pointed ellipses, indicating an elongation of the period. </a:t>
             </a:r>
           </a:p>
@@ -19594,7 +20172,7 @@
         <p:spPr>
           <a:xfrm>
             <a:off x="21471911" y="6281665"/>
-            <a:ext cx="10038662" cy="1615805"/>
+            <a:ext cx="10038662" cy="1754304"/>
           </a:xfrm>
           <a:prstGeom prst="rect">
             <a:avLst/>
@@ -19777,7 +20355,11 @@
               </a:lnSpc>
             </a:pPr>
             <a:r>
-              <a:rPr lang="en-US" dirty="0"/>
+              <a:rPr lang="en-US" sz="2800" dirty="0">
+                <a:solidFill>
+                  <a:schemeClr val="tx1"/>
+                </a:solidFill>
+              </a:rPr>
               <a:t>Elliptical phase space orbits indicate harmonic pendulum oscillations. Adding a damping force to the system causes the orbits to converge to a single point.</a:t>
             </a:r>
           </a:p>
@@ -19802,7 +20384,7 @@
             <p:spPr>
               <a:xfrm>
                 <a:off x="25301876" y="15144161"/>
-                <a:ext cx="6829427" cy="1154140"/>
+                <a:ext cx="6829427" cy="2012837"/>
               </a:xfrm>
               <a:prstGeom prst="rect">
                 <a:avLst/>
@@ -19981,13 +20563,20 @@
               <a:p>
                 <a:pPr algn="just"/>
                 <a:r>
-                  <a:rPr lang="en-US" dirty="0"/>
+                  <a:rPr lang="en-US" sz="2800" dirty="0">
+                    <a:solidFill>
+                      <a:schemeClr val="tx1"/>
+                    </a:solidFill>
+                  </a:rPr>
                   <a:t>As the initial angle approaches </a:t>
                 </a:r>
                 <a14:m>
                   <m:oMath xmlns:m="http://schemas.openxmlformats.org/officeDocument/2006/math">
                     <m:r>
-                      <a:rPr lang="en-US" b="0" i="1" smtClean="0">
+                      <a:rPr lang="en-US" sz="2800" b="0" i="1" smtClean="0">
+                        <a:solidFill>
+                          <a:schemeClr val="tx1"/>
+                        </a:solidFill>
                         <a:latin typeface="Cambria Math" panose="02040503050406030204" pitchFamily="18" charset="0"/>
                       </a:rPr>
                       <m:t>𝜋</m:t>
@@ -19995,8 +20584,33 @@
                   </m:oMath>
                 </a14:m>
                 <a:r>
-                  <a:rPr lang="en-US" dirty="0"/>
-                  <a:t>, the period of oscillations quickly diverges.</a:t>
+                  <a:rPr lang="en-US" sz="2800" dirty="0">
+                    <a:solidFill>
+                      <a:schemeClr val="tx1"/>
+                    </a:solidFill>
+                  </a:rPr>
+                  <a:t>, the period of oscillations quickly diverges. When the initial angle is equal to </a:t>
+                </a:r>
+                <a14:m>
+                  <m:oMath xmlns:m="http://schemas.openxmlformats.org/officeDocument/2006/math">
+                    <m:r>
+                      <a:rPr lang="en-US" sz="2800" b="0" i="1" smtClean="0">
+                        <a:solidFill>
+                          <a:schemeClr val="tx1"/>
+                        </a:solidFill>
+                        <a:latin typeface="Cambria Math" panose="02040503050406030204" pitchFamily="18" charset="0"/>
+                      </a:rPr>
+                      <m:t>𝜋</m:t>
+                    </m:r>
+                  </m:oMath>
+                </a14:m>
+                <a:r>
+                  <a:rPr lang="en-US" sz="2800" dirty="0">
+                    <a:solidFill>
+                      <a:schemeClr val="tx1"/>
+                    </a:solidFill>
+                  </a:rPr>
+                  <a:t> the system becomes unstable.</a:t>
                 </a:r>
               </a:p>
             </p:txBody>
@@ -20020,13 +20634,13 @@
             <p:spPr>
               <a:xfrm>
                 <a:off x="25301876" y="15144161"/>
-                <a:ext cx="6829427" cy="1154140"/>
+                <a:ext cx="6829427" cy="2012837"/>
               </a:xfrm>
               <a:prstGeom prst="rect">
                 <a:avLst/>
               </a:prstGeom>
               <a:blipFill>
-                <a:blip r:embed="rId15"/>
+                <a:blip r:embed="rId13"/>
                 <a:stretch>
                   <a:fillRect/>
                 </a:stretch>
@@ -20047,12 +20661,332 @@
           </p:sp>
         </mc:Fallback>
       </mc:AlternateContent>
+      <p:sp>
+        <p:nvSpPr>
+          <p:cNvPr id="62" name="Text Placeholder 90">
+            <a:extLst>
+              <a:ext uri="{FF2B5EF4-FFF2-40B4-BE49-F238E27FC236}">
+                <a16:creationId xmlns:a16="http://schemas.microsoft.com/office/drawing/2014/main" id="{2598926A-A1B4-A143-A74C-813F9CC1A1D2}"/>
+              </a:ext>
+            </a:extLst>
+          </p:cNvPr>
+          <p:cNvSpPr txBox="1">
+            <a:spLocks/>
+          </p:cNvSpPr>
+          <p:nvPr/>
+        </p:nvSpPr>
+        <p:spPr>
+          <a:xfrm>
+            <a:off x="11400134" y="23095968"/>
+            <a:ext cx="20974055" cy="697106"/>
+          </a:xfrm>
+          <a:prstGeom prst="rect">
+            <a:avLst/>
+          </a:prstGeom>
+          <a:gradFill flip="none" rotWithShape="1">
+            <a:gsLst>
+              <a:gs pos="0">
+                <a:srgbClr val="FF9300">
+                  <a:tint val="66000"/>
+                  <a:satMod val="160000"/>
+                </a:srgbClr>
+              </a:gs>
+              <a:gs pos="50000">
+                <a:srgbClr val="FF9300">
+                  <a:tint val="44500"/>
+                  <a:satMod val="160000"/>
+                </a:srgbClr>
+              </a:gs>
+              <a:gs pos="100000">
+                <a:srgbClr val="FF9300">
+                  <a:tint val="23500"/>
+                  <a:satMod val="160000"/>
+                </a:srgbClr>
+              </a:gs>
+            </a:gsLst>
+            <a:path path="circle">
+              <a:fillToRect l="50000" t="50000" r="50000" b="50000"/>
+            </a:path>
+            <a:tileRect/>
+          </a:gradFill>
+          <a:ln>
+            <a:solidFill>
+              <a:schemeClr val="accent5">
+                <a:lumMod val="50000"/>
+              </a:schemeClr>
+            </a:solidFill>
+          </a:ln>
+        </p:spPr>
+        <p:txBody>
+          <a:bodyPr vert="horz" lIns="91436" tIns="91436" rIns="91436" bIns="91436" rtlCol="0" anchor="ctr" anchorCtr="0">
+            <a:spAutoFit/>
+          </a:bodyPr>
+          <a:lstStyle>
+            <a:lvl1pPr marL="0" indent="0" algn="ctr" defTabSz="4389120" rtl="0" eaLnBrk="1" latinLnBrk="0" hangingPunct="1">
+              <a:lnSpc>
+                <a:spcPct val="90000"/>
+              </a:lnSpc>
+              <a:spcBef>
+                <a:spcPts val="4800"/>
+              </a:spcBef>
+              <a:buFont typeface="Arial" panose="020B0604020202020204" pitchFamily="34" charset="0"/>
+              <a:buNone/>
+              <a:defRPr sz="3700" b="1" u="sng" kern="1200" baseline="0">
+                <a:solidFill>
+                  <a:schemeClr val="accent5">
+                    <a:lumMod val="50000"/>
+                  </a:schemeClr>
+                </a:solidFill>
+                <a:latin typeface="+mn-lt"/>
+                <a:ea typeface="+mn-ea"/>
+                <a:cs typeface="+mn-cs"/>
+              </a:defRPr>
+            </a:lvl1pPr>
+            <a:lvl2pPr marL="3291840" indent="-1097280" algn="l" defTabSz="4389120" rtl="0" eaLnBrk="1" latinLnBrk="0" hangingPunct="1">
+              <a:lnSpc>
+                <a:spcPct val="90000"/>
+              </a:lnSpc>
+              <a:spcBef>
+                <a:spcPts val="2400"/>
+              </a:spcBef>
+              <a:buFont typeface="Arial" panose="020B0604020202020204" pitchFamily="34" charset="0"/>
+              <a:buChar char="•"/>
+              <a:defRPr sz="11520" kern="1200">
+                <a:solidFill>
+                  <a:schemeClr val="tx1"/>
+                </a:solidFill>
+                <a:latin typeface="+mn-lt"/>
+                <a:ea typeface="+mn-ea"/>
+                <a:cs typeface="+mn-cs"/>
+              </a:defRPr>
+            </a:lvl2pPr>
+            <a:lvl3pPr marL="5486400" indent="-1097280" algn="l" defTabSz="4389120" rtl="0" eaLnBrk="1" latinLnBrk="0" hangingPunct="1">
+              <a:lnSpc>
+                <a:spcPct val="90000"/>
+              </a:lnSpc>
+              <a:spcBef>
+                <a:spcPts val="2400"/>
+              </a:spcBef>
+              <a:buFont typeface="Arial" panose="020B0604020202020204" pitchFamily="34" charset="0"/>
+              <a:buChar char="•"/>
+              <a:defRPr sz="9600" kern="1200">
+                <a:solidFill>
+                  <a:schemeClr val="tx1"/>
+                </a:solidFill>
+                <a:latin typeface="+mn-lt"/>
+                <a:ea typeface="+mn-ea"/>
+                <a:cs typeface="+mn-cs"/>
+              </a:defRPr>
+            </a:lvl3pPr>
+            <a:lvl4pPr marL="7680960" indent="-1097280" algn="l" defTabSz="4389120" rtl="0" eaLnBrk="1" latinLnBrk="0" hangingPunct="1">
+              <a:lnSpc>
+                <a:spcPct val="90000"/>
+              </a:lnSpc>
+              <a:spcBef>
+                <a:spcPts val="2400"/>
+              </a:spcBef>
+              <a:buFont typeface="Arial" panose="020B0604020202020204" pitchFamily="34" charset="0"/>
+              <a:buChar char="•"/>
+              <a:defRPr sz="8640" kern="1200">
+                <a:solidFill>
+                  <a:schemeClr val="tx1"/>
+                </a:solidFill>
+                <a:latin typeface="+mn-lt"/>
+                <a:ea typeface="+mn-ea"/>
+                <a:cs typeface="+mn-cs"/>
+              </a:defRPr>
+            </a:lvl4pPr>
+            <a:lvl5pPr marL="9875520" indent="-1097280" algn="l" defTabSz="4389120" rtl="0" eaLnBrk="1" latinLnBrk="0" hangingPunct="1">
+              <a:lnSpc>
+                <a:spcPct val="90000"/>
+              </a:lnSpc>
+              <a:spcBef>
+                <a:spcPts val="2400"/>
+              </a:spcBef>
+              <a:buFont typeface="Arial" panose="020B0604020202020204" pitchFamily="34" charset="0"/>
+              <a:buChar char="•"/>
+              <a:defRPr sz="8640" kern="1200">
+                <a:solidFill>
+                  <a:schemeClr val="tx1"/>
+                </a:solidFill>
+                <a:latin typeface="+mn-lt"/>
+                <a:ea typeface="+mn-ea"/>
+                <a:cs typeface="+mn-cs"/>
+              </a:defRPr>
+            </a:lvl5pPr>
+            <a:lvl6pPr marL="12070080" indent="-1097280" algn="l" defTabSz="4389120" rtl="0" eaLnBrk="1" latinLnBrk="0" hangingPunct="1">
+              <a:lnSpc>
+                <a:spcPct val="90000"/>
+              </a:lnSpc>
+              <a:spcBef>
+                <a:spcPts val="2400"/>
+              </a:spcBef>
+              <a:buFont typeface="Arial" panose="020B0604020202020204" pitchFamily="34" charset="0"/>
+              <a:buChar char="•"/>
+              <a:defRPr sz="8640" kern="1200">
+                <a:solidFill>
+                  <a:schemeClr val="tx1"/>
+                </a:solidFill>
+                <a:latin typeface="+mn-lt"/>
+                <a:ea typeface="+mn-ea"/>
+                <a:cs typeface="+mn-cs"/>
+              </a:defRPr>
+            </a:lvl6pPr>
+            <a:lvl7pPr marL="14264640" indent="-1097280" algn="l" defTabSz="4389120" rtl="0" eaLnBrk="1" latinLnBrk="0" hangingPunct="1">
+              <a:lnSpc>
+                <a:spcPct val="90000"/>
+              </a:lnSpc>
+              <a:spcBef>
+                <a:spcPts val="2400"/>
+              </a:spcBef>
+              <a:buFont typeface="Arial" panose="020B0604020202020204" pitchFamily="34" charset="0"/>
+              <a:buChar char="•"/>
+              <a:defRPr sz="8640" kern="1200">
+                <a:solidFill>
+                  <a:schemeClr val="tx1"/>
+                </a:solidFill>
+                <a:latin typeface="+mn-lt"/>
+                <a:ea typeface="+mn-ea"/>
+                <a:cs typeface="+mn-cs"/>
+              </a:defRPr>
+            </a:lvl7pPr>
+            <a:lvl8pPr marL="16459200" indent="-1097280" algn="l" defTabSz="4389120" rtl="0" eaLnBrk="1" latinLnBrk="0" hangingPunct="1">
+              <a:lnSpc>
+                <a:spcPct val="90000"/>
+              </a:lnSpc>
+              <a:spcBef>
+                <a:spcPts val="2400"/>
+              </a:spcBef>
+              <a:buFont typeface="Arial" panose="020B0604020202020204" pitchFamily="34" charset="0"/>
+              <a:buChar char="•"/>
+              <a:defRPr sz="8640" kern="1200">
+                <a:solidFill>
+                  <a:schemeClr val="tx1"/>
+                </a:solidFill>
+                <a:latin typeface="+mn-lt"/>
+                <a:ea typeface="+mn-ea"/>
+                <a:cs typeface="+mn-cs"/>
+              </a:defRPr>
+            </a:lvl8pPr>
+            <a:lvl9pPr marL="18653760" indent="-1097280" algn="l" defTabSz="4389120" rtl="0" eaLnBrk="1" latinLnBrk="0" hangingPunct="1">
+              <a:lnSpc>
+                <a:spcPct val="90000"/>
+              </a:lnSpc>
+              <a:spcBef>
+                <a:spcPts val="2400"/>
+              </a:spcBef>
+              <a:buFont typeface="Arial" panose="020B0604020202020204" pitchFamily="34" charset="0"/>
+              <a:buChar char="•"/>
+              <a:defRPr sz="8640" kern="1200">
+                <a:solidFill>
+                  <a:schemeClr val="tx1"/>
+                </a:solidFill>
+                <a:latin typeface="+mn-lt"/>
+                <a:ea typeface="+mn-ea"/>
+                <a:cs typeface="+mn-cs"/>
+              </a:defRPr>
+            </a:lvl9pPr>
+          </a:lstStyle>
+          <a:p>
+            <a:r>
+              <a:rPr lang="en-US" u="none" dirty="0"/>
+              <a:t>The Chaotic Oscillator</a:t>
+            </a:r>
+          </a:p>
+        </p:txBody>
+      </p:sp>
       <p:pic>
         <p:nvPicPr>
-          <p:cNvPr id="40" name="Picture 39">
+          <p:cNvPr id="67" name="Picture 66">
             <a:extLst>
               <a:ext uri="{FF2B5EF4-FFF2-40B4-BE49-F238E27FC236}">
-                <a16:creationId xmlns:a16="http://schemas.microsoft.com/office/drawing/2014/main" id="{8681B195-5D34-4747-A94D-11D6C0492740}"/>
+                <a16:creationId xmlns:a16="http://schemas.microsoft.com/office/drawing/2014/main" id="{673FF9F6-7E69-5341-B281-173FFC949717}"/>
+              </a:ext>
+            </a:extLst>
+          </p:cNvPr>
+          <p:cNvPicPr>
+            <a:picLocks noChangeAspect="1"/>
+          </p:cNvPicPr>
+          <p:nvPr/>
+        </p:nvPicPr>
+        <p:blipFill>
+          <a:blip r:embed="rId14">
+            <a:extLst>
+              <a:ext uri="{28A0092B-C50C-407E-A947-70E740481C1C}">
+                <a14:useLocalDpi xmlns:a14="http://schemas.microsoft.com/office/drawing/2010/main" val="0"/>
+              </a:ext>
+            </a:extLst>
+          </a:blip>
+          <a:stretch>
+            <a:fillRect/>
+          </a:stretch>
+        </p:blipFill>
+        <p:spPr>
+          <a:xfrm>
+            <a:off x="12369783" y="17210982"/>
+            <a:ext cx="18548985" cy="5000625"/>
+          </a:xfrm>
+          <a:prstGeom prst="rect">
+            <a:avLst/>
+          </a:prstGeom>
+          <a:ln>
+            <a:solidFill>
+              <a:schemeClr val="accent4">
+                <a:lumMod val="50000"/>
+              </a:schemeClr>
+            </a:solidFill>
+          </a:ln>
+        </p:spPr>
+      </p:pic>
+      <p:pic>
+        <p:nvPicPr>
+          <p:cNvPr id="71" name="Picture 70">
+            <a:extLst>
+              <a:ext uri="{FF2B5EF4-FFF2-40B4-BE49-F238E27FC236}">
+                <a16:creationId xmlns:a16="http://schemas.microsoft.com/office/drawing/2014/main" id="{A0E4D42C-A08E-5A41-A0B8-BE77F02DADD7}"/>
+              </a:ext>
+            </a:extLst>
+          </p:cNvPr>
+          <p:cNvPicPr>
+            <a:picLocks noChangeAspect="1"/>
+          </p:cNvPicPr>
+          <p:nvPr/>
+        </p:nvPicPr>
+        <p:blipFill>
+          <a:blip r:embed="rId15">
+            <a:extLst>
+              <a:ext uri="{28A0092B-C50C-407E-A947-70E740481C1C}">
+                <a14:useLocalDpi xmlns:a14="http://schemas.microsoft.com/office/drawing/2010/main" val="0"/>
+              </a:ext>
+            </a:extLst>
+          </a:blip>
+          <a:stretch>
+            <a:fillRect/>
+          </a:stretch>
+        </p:blipFill>
+        <p:spPr>
+          <a:xfrm>
+            <a:off x="21673168" y="24525440"/>
+            <a:ext cx="9245600" cy="6819900"/>
+          </a:xfrm>
+          <a:prstGeom prst="rect">
+            <a:avLst/>
+          </a:prstGeom>
+          <a:ln>
+            <a:solidFill>
+              <a:schemeClr val="accent4">
+                <a:lumMod val="50000"/>
+              </a:schemeClr>
+            </a:solidFill>
+          </a:ln>
+        </p:spPr>
+      </p:pic>
+      <p:pic>
+        <p:nvPicPr>
+          <p:cNvPr id="75" name="Picture 74">
+            <a:extLst>
+              <a:ext uri="{FF2B5EF4-FFF2-40B4-BE49-F238E27FC236}">
+                <a16:creationId xmlns:a16="http://schemas.microsoft.com/office/drawing/2014/main" id="{AB71DE38-CC57-074F-BABD-AA41FDAC8F29}"/>
               </a:ext>
             </a:extLst>
           </p:cNvPr>
@@ -20075,286 +21009,19 @@
         </p:blipFill>
         <p:spPr>
           <a:xfrm>
-            <a:off x="10902440" y="17064436"/>
-            <a:ext cx="7315200" cy="4855776"/>
+            <a:off x="12422536" y="24525440"/>
+            <a:ext cx="9245600" cy="6819900"/>
           </a:xfrm>
           <a:prstGeom prst="rect">
             <a:avLst/>
           </a:prstGeom>
-        </p:spPr>
-      </p:pic>
-      <p:sp>
-        <p:nvSpPr>
-          <p:cNvPr id="62" name="Text Placeholder 90">
-            <a:extLst>
-              <a:ext uri="{FF2B5EF4-FFF2-40B4-BE49-F238E27FC236}">
-                <a16:creationId xmlns:a16="http://schemas.microsoft.com/office/drawing/2014/main" id="{2598926A-A1B4-A143-A74C-813F9CC1A1D2}"/>
-              </a:ext>
-            </a:extLst>
-          </p:cNvPr>
-          <p:cNvSpPr txBox="1">
-            <a:spLocks/>
-          </p:cNvSpPr>
-          <p:nvPr/>
-        </p:nvSpPr>
-        <p:spPr>
-          <a:xfrm>
-            <a:off x="11400133" y="22444413"/>
-            <a:ext cx="20974055" cy="697106"/>
-          </a:xfrm>
-          <a:prstGeom prst="rect">
-            <a:avLst/>
-          </a:prstGeom>
-          <a:noFill/>
-        </p:spPr>
-        <p:txBody>
-          <a:bodyPr vert="horz" lIns="91436" tIns="91436" rIns="91436" bIns="91436" rtlCol="0" anchor="ctr" anchorCtr="0">
-            <a:spAutoFit/>
-          </a:bodyPr>
-          <a:lstStyle>
-            <a:lvl1pPr marL="0" indent="0" algn="ctr" defTabSz="4389120" rtl="0" eaLnBrk="1" latinLnBrk="0" hangingPunct="1">
-              <a:lnSpc>
-                <a:spcPct val="90000"/>
-              </a:lnSpc>
-              <a:spcBef>
-                <a:spcPts val="4800"/>
-              </a:spcBef>
-              <a:buFont typeface="Arial" panose="020B0604020202020204" pitchFamily="34" charset="0"/>
-              <a:buNone/>
-              <a:defRPr sz="3700" b="1" u="sng" kern="1200" baseline="0">
-                <a:solidFill>
-                  <a:schemeClr val="accent5">
-                    <a:lumMod val="50000"/>
-                  </a:schemeClr>
-                </a:solidFill>
-                <a:latin typeface="+mn-lt"/>
-                <a:ea typeface="+mn-ea"/>
-                <a:cs typeface="+mn-cs"/>
-              </a:defRPr>
-            </a:lvl1pPr>
-            <a:lvl2pPr marL="3291840" indent="-1097280" algn="l" defTabSz="4389120" rtl="0" eaLnBrk="1" latinLnBrk="0" hangingPunct="1">
-              <a:lnSpc>
-                <a:spcPct val="90000"/>
-              </a:lnSpc>
-              <a:spcBef>
-                <a:spcPts val="2400"/>
-              </a:spcBef>
-              <a:buFont typeface="Arial" panose="020B0604020202020204" pitchFamily="34" charset="0"/>
-              <a:buChar char="•"/>
-              <a:defRPr sz="11520" kern="1200">
-                <a:solidFill>
-                  <a:schemeClr val="tx1"/>
-                </a:solidFill>
-                <a:latin typeface="+mn-lt"/>
-                <a:ea typeface="+mn-ea"/>
-                <a:cs typeface="+mn-cs"/>
-              </a:defRPr>
-            </a:lvl2pPr>
-            <a:lvl3pPr marL="5486400" indent="-1097280" algn="l" defTabSz="4389120" rtl="0" eaLnBrk="1" latinLnBrk="0" hangingPunct="1">
-              <a:lnSpc>
-                <a:spcPct val="90000"/>
-              </a:lnSpc>
-              <a:spcBef>
-                <a:spcPts val="2400"/>
-              </a:spcBef>
-              <a:buFont typeface="Arial" panose="020B0604020202020204" pitchFamily="34" charset="0"/>
-              <a:buChar char="•"/>
-              <a:defRPr sz="9600" kern="1200">
-                <a:solidFill>
-                  <a:schemeClr val="tx1"/>
-                </a:solidFill>
-                <a:latin typeface="+mn-lt"/>
-                <a:ea typeface="+mn-ea"/>
-                <a:cs typeface="+mn-cs"/>
-              </a:defRPr>
-            </a:lvl3pPr>
-            <a:lvl4pPr marL="7680960" indent="-1097280" algn="l" defTabSz="4389120" rtl="0" eaLnBrk="1" latinLnBrk="0" hangingPunct="1">
-              <a:lnSpc>
-                <a:spcPct val="90000"/>
-              </a:lnSpc>
-              <a:spcBef>
-                <a:spcPts val="2400"/>
-              </a:spcBef>
-              <a:buFont typeface="Arial" panose="020B0604020202020204" pitchFamily="34" charset="0"/>
-              <a:buChar char="•"/>
-              <a:defRPr sz="8640" kern="1200">
-                <a:solidFill>
-                  <a:schemeClr val="tx1"/>
-                </a:solidFill>
-                <a:latin typeface="+mn-lt"/>
-                <a:ea typeface="+mn-ea"/>
-                <a:cs typeface="+mn-cs"/>
-              </a:defRPr>
-            </a:lvl4pPr>
-            <a:lvl5pPr marL="9875520" indent="-1097280" algn="l" defTabSz="4389120" rtl="0" eaLnBrk="1" latinLnBrk="0" hangingPunct="1">
-              <a:lnSpc>
-                <a:spcPct val="90000"/>
-              </a:lnSpc>
-              <a:spcBef>
-                <a:spcPts val="2400"/>
-              </a:spcBef>
-              <a:buFont typeface="Arial" panose="020B0604020202020204" pitchFamily="34" charset="0"/>
-              <a:buChar char="•"/>
-              <a:defRPr sz="8640" kern="1200">
-                <a:solidFill>
-                  <a:schemeClr val="tx1"/>
-                </a:solidFill>
-                <a:latin typeface="+mn-lt"/>
-                <a:ea typeface="+mn-ea"/>
-                <a:cs typeface="+mn-cs"/>
-              </a:defRPr>
-            </a:lvl5pPr>
-            <a:lvl6pPr marL="12070080" indent="-1097280" algn="l" defTabSz="4389120" rtl="0" eaLnBrk="1" latinLnBrk="0" hangingPunct="1">
-              <a:lnSpc>
-                <a:spcPct val="90000"/>
-              </a:lnSpc>
-              <a:spcBef>
-                <a:spcPts val="2400"/>
-              </a:spcBef>
-              <a:buFont typeface="Arial" panose="020B0604020202020204" pitchFamily="34" charset="0"/>
-              <a:buChar char="•"/>
-              <a:defRPr sz="8640" kern="1200">
-                <a:solidFill>
-                  <a:schemeClr val="tx1"/>
-                </a:solidFill>
-                <a:latin typeface="+mn-lt"/>
-                <a:ea typeface="+mn-ea"/>
-                <a:cs typeface="+mn-cs"/>
-              </a:defRPr>
-            </a:lvl6pPr>
-            <a:lvl7pPr marL="14264640" indent="-1097280" algn="l" defTabSz="4389120" rtl="0" eaLnBrk="1" latinLnBrk="0" hangingPunct="1">
-              <a:lnSpc>
-                <a:spcPct val="90000"/>
-              </a:lnSpc>
-              <a:spcBef>
-                <a:spcPts val="2400"/>
-              </a:spcBef>
-              <a:buFont typeface="Arial" panose="020B0604020202020204" pitchFamily="34" charset="0"/>
-              <a:buChar char="•"/>
-              <a:defRPr sz="8640" kern="1200">
-                <a:solidFill>
-                  <a:schemeClr val="tx1"/>
-                </a:solidFill>
-                <a:latin typeface="+mn-lt"/>
-                <a:ea typeface="+mn-ea"/>
-                <a:cs typeface="+mn-cs"/>
-              </a:defRPr>
-            </a:lvl7pPr>
-            <a:lvl8pPr marL="16459200" indent="-1097280" algn="l" defTabSz="4389120" rtl="0" eaLnBrk="1" latinLnBrk="0" hangingPunct="1">
-              <a:lnSpc>
-                <a:spcPct val="90000"/>
-              </a:lnSpc>
-              <a:spcBef>
-                <a:spcPts val="2400"/>
-              </a:spcBef>
-              <a:buFont typeface="Arial" panose="020B0604020202020204" pitchFamily="34" charset="0"/>
-              <a:buChar char="•"/>
-              <a:defRPr sz="8640" kern="1200">
-                <a:solidFill>
-                  <a:schemeClr val="tx1"/>
-                </a:solidFill>
-                <a:latin typeface="+mn-lt"/>
-                <a:ea typeface="+mn-ea"/>
-                <a:cs typeface="+mn-cs"/>
-              </a:defRPr>
-            </a:lvl8pPr>
-            <a:lvl9pPr marL="18653760" indent="-1097280" algn="l" defTabSz="4389120" rtl="0" eaLnBrk="1" latinLnBrk="0" hangingPunct="1">
-              <a:lnSpc>
-                <a:spcPct val="90000"/>
-              </a:lnSpc>
-              <a:spcBef>
-                <a:spcPts val="2400"/>
-              </a:spcBef>
-              <a:buFont typeface="Arial" panose="020B0604020202020204" pitchFamily="34" charset="0"/>
-              <a:buChar char="•"/>
-              <a:defRPr sz="8640" kern="1200">
-                <a:solidFill>
-                  <a:schemeClr val="tx1"/>
-                </a:solidFill>
-                <a:latin typeface="+mn-lt"/>
-                <a:ea typeface="+mn-ea"/>
-                <a:cs typeface="+mn-cs"/>
-              </a:defRPr>
-            </a:lvl9pPr>
-          </a:lstStyle>
-          <a:p>
-            <a:r>
-              <a:rPr lang="en-US" u="none" dirty="0"/>
-              <a:t>The Chaotic Oscillator</a:t>
-            </a:r>
-          </a:p>
-        </p:txBody>
-      </p:sp>
-      <p:pic>
-        <p:nvPicPr>
-          <p:cNvPr id="52" name="Picture 51">
-            <a:extLst>
-              <a:ext uri="{FF2B5EF4-FFF2-40B4-BE49-F238E27FC236}">
-                <a16:creationId xmlns:a16="http://schemas.microsoft.com/office/drawing/2014/main" id="{16D3C10E-98D9-7A40-ACD1-051A33E33B84}"/>
-              </a:ext>
-            </a:extLst>
-          </p:cNvPr>
-          <p:cNvPicPr>
-            <a:picLocks noChangeAspect="1"/>
-          </p:cNvPicPr>
-          <p:nvPr/>
-        </p:nvPicPr>
-        <p:blipFill>
-          <a:blip r:embed="rId17">
-            <a:extLst>
-              <a:ext uri="{28A0092B-C50C-407E-A947-70E740481C1C}">
-                <a14:useLocalDpi xmlns:a14="http://schemas.microsoft.com/office/drawing/2010/main" val="0"/>
-              </a:ext>
-            </a:extLst>
-          </a:blip>
-          <a:stretch>
-            <a:fillRect/>
-          </a:stretch>
-        </p:blipFill>
-        <p:spPr>
-          <a:xfrm>
-            <a:off x="21541073" y="24257671"/>
-            <a:ext cx="9969500" cy="6718300"/>
-          </a:xfrm>
-          <a:prstGeom prst="rect">
-            <a:avLst/>
-          </a:prstGeom>
-        </p:spPr>
-      </p:pic>
-      <p:pic>
-        <p:nvPicPr>
-          <p:cNvPr id="56" name="Picture 55">
-            <a:extLst>
-              <a:ext uri="{FF2B5EF4-FFF2-40B4-BE49-F238E27FC236}">
-                <a16:creationId xmlns:a16="http://schemas.microsoft.com/office/drawing/2014/main" id="{14EDBDC2-0F96-3943-8BEA-48CA5FC2911B}"/>
-              </a:ext>
-            </a:extLst>
-          </p:cNvPr>
-          <p:cNvPicPr>
-            <a:picLocks noChangeAspect="1"/>
-          </p:cNvPicPr>
-          <p:nvPr/>
-        </p:nvPicPr>
-        <p:blipFill>
-          <a:blip r:embed="rId18">
-            <a:extLst>
-              <a:ext uri="{28A0092B-C50C-407E-A947-70E740481C1C}">
-                <a14:useLocalDpi xmlns:a14="http://schemas.microsoft.com/office/drawing/2010/main" val="0"/>
-              </a:ext>
-            </a:extLst>
-          </a:blip>
-          <a:stretch>
-            <a:fillRect/>
-          </a:stretch>
-        </p:blipFill>
-        <p:spPr>
-          <a:xfrm>
-            <a:off x="11528441" y="24249347"/>
-            <a:ext cx="10007600" cy="6718300"/>
-          </a:xfrm>
-          <a:prstGeom prst="rect">
-            <a:avLst/>
-          </a:prstGeom>
+          <a:ln>
+            <a:solidFill>
+              <a:schemeClr val="accent4">
+                <a:lumMod val="50000"/>
+              </a:schemeClr>
+            </a:solidFill>
+          </a:ln>
         </p:spPr>
       </p:pic>
     </p:spTree>

</xml_diff>

<commit_message>
worked on conclusion, need to polish it
</commit_message>
<xml_diff>
--- a/Poster.pptx
+++ b/Poster.pptx
@@ -17700,12 +17700,35 @@
             <p:ph type="body" sz="quarter" idx="26"/>
           </p:nvPr>
         </p:nvSpPr>
-        <p:spPr/>
+        <p:spPr>
+          <a:xfrm>
+            <a:off x="33390292" y="6378481"/>
+            <a:ext cx="10047018" cy="1304309"/>
+          </a:xfrm>
+          <a:solidFill>
+            <a:srgbClr val="EAEAEA"/>
+          </a:solidFill>
+          <a:ln>
+            <a:solidFill>
+              <a:schemeClr val="accent4">
+                <a:lumMod val="50000"/>
+              </a:schemeClr>
+            </a:solidFill>
+          </a:ln>
+        </p:spPr>
         <p:txBody>
           <a:bodyPr/>
           <a:lstStyle/>
           <a:p>
-            <a:endParaRPr lang="en-US" dirty="0"/>
+            <a:pPr>
+              <a:lnSpc>
+                <a:spcPct val="114000"/>
+              </a:lnSpc>
+            </a:pPr>
+            <a:r>
+              <a:rPr lang="en-US" dirty="0"/>
+              <a:t>As the external driving force is varied, period doubling behavior progressively arises until the system eventually becomes chaotic.</a:t>
+            </a:r>
           </a:p>
         </p:txBody>
       </p:sp>
@@ -17726,6 +17749,10 @@
           </p:nvPr>
         </p:nvSpPr>
         <p:spPr>
+          <a:xfrm>
+            <a:off x="33390292" y="14301207"/>
+            <a:ext cx="10047018" cy="697106"/>
+          </a:xfrm>
           <a:solidFill>
             <a:srgbClr val="FFAF79"/>
           </a:solidFill>
@@ -17741,7 +17768,10 @@
           <a:bodyPr/>
           <a:lstStyle/>
           <a:p>
-            <a:endParaRPr lang="en-US" dirty="0"/>
+            <a:r>
+              <a:rPr lang="en-US" u="none" dirty="0"/>
+              <a:t>A Complicated Story</a:t>
+            </a:r>
           </a:p>
         </p:txBody>
       </p:sp>
@@ -17761,12 +17791,78 @@
             <p:ph type="body" sz="quarter" idx="28"/>
           </p:nvPr>
         </p:nvSpPr>
-        <p:spPr/>
+        <p:spPr>
+          <a:xfrm>
+            <a:off x="33390292" y="15144161"/>
+            <a:ext cx="10052050" cy="8968587"/>
+          </a:xfrm>
+          <a:solidFill>
+            <a:srgbClr val="EAEAEA"/>
+          </a:solidFill>
+          <a:ln>
+            <a:solidFill>
+              <a:schemeClr val="accent4">
+                <a:lumMod val="50000"/>
+              </a:schemeClr>
+            </a:solidFill>
+          </a:ln>
+        </p:spPr>
         <p:txBody>
           <a:bodyPr/>
           <a:lstStyle/>
           <a:p>
-            <a:endParaRPr lang="en-US"/>
+            <a:r>
+              <a:rPr lang="en-US" sz="2800" dirty="0"/>
+              <a:t>After exploring these three cases, we can appreciate how the dynamics of the pendulum become more complicated as we increased the influence of external forces in the system. In particular:</a:t>
+            </a:r>
+          </a:p>
+          <a:p>
+            <a:pPr marL="457200" indent="-457200">
+              <a:buFont typeface="Helvetica" pitchFamily="2" charset="0"/>
+              <a:buChar char="‣"/>
+            </a:pPr>
+            <a:r>
+              <a:rPr lang="en-US" sz="2800" dirty="0"/>
+              <a:t>For no external driving forces, the system behaves in an easily predictable manner.</a:t>
+            </a:r>
+          </a:p>
+          <a:p>
+            <a:pPr marL="457200" indent="-457200">
+              <a:buFont typeface="Helvetica" pitchFamily="2" charset="0"/>
+              <a:buChar char="‣"/>
+            </a:pPr>
+            <a:r>
+              <a:rPr lang="en-US" sz="2800" dirty="0"/>
+              <a:t>The system becomes increasingly sensitive to initial conditions as we deviate from simple linear approximations to nonlinear behavior.</a:t>
+            </a:r>
+          </a:p>
+          <a:p>
+            <a:pPr marL="457200" indent="-457200">
+              <a:buFont typeface="Helvetica" pitchFamily="2" charset="0"/>
+              <a:buChar char="‣"/>
+            </a:pPr>
+            <a:r>
+              <a:rPr lang="en-US" sz="2800" dirty="0"/>
+              <a:t>Adding external forces to the system heightens the system’s sensitivity to initial conditions. </a:t>
+            </a:r>
+          </a:p>
+          <a:p>
+            <a:pPr marL="457200" indent="-457200">
+              <a:buFont typeface="Helvetica" pitchFamily="2" charset="0"/>
+              <a:buChar char="‣"/>
+            </a:pPr>
+            <a:r>
+              <a:rPr lang="en-US" sz="2800" dirty="0"/>
+              <a:t>Further increasing the influence of external forces in the system makes the behavior unpredictable </a:t>
+            </a:r>
+            <a:r>
+              <a:rPr lang="en-US" sz="2800"/>
+              <a:t>and chaotic.</a:t>
+            </a:r>
+            <a:endParaRPr lang="en-US" sz="2800" dirty="0"/>
+          </a:p>
+          <a:p>
+            <a:endParaRPr lang="en-US" sz="2800" dirty="0"/>
           </a:p>
         </p:txBody>
       </p:sp>

</xml_diff>

<commit_message>
specified number of iterations for bifurcation diagram
</commit_message>
<xml_diff>
--- a/Poster.pptx
+++ b/Poster.pptx
@@ -257,7 +257,7 @@
             <a:fld id="{0158C5BC-9A70-462C-B28D-9600239EAC64}" type="datetimeFigureOut">
               <a:rPr lang="en-US" smtClean="0"/>
               <a:pPr/>
-              <a:t>11/30/19</a:t>
+              <a:t>12/3/19</a:t>
             </a:fld>
             <a:endParaRPr lang="en-US"/>
           </a:p>
@@ -424,7 +424,7 @@
             <a:fld id="{E6CC2317-6751-4CD4-9995-8782DD78E936}" type="datetimeFigureOut">
               <a:rPr lang="en-US" smtClean="0"/>
               <a:pPr/>
-              <a:t>11/30/19</a:t>
+              <a:t>12/3/19</a:t>
             </a:fld>
             <a:endParaRPr lang="en-US" dirty="0"/>
           </a:p>
@@ -2085,7 +2085,7 @@
           <a:p>
             <a:fld id="{FD2F1D65-88FA-B345-95F8-A8FCF199D2AD}" type="datetimeFigureOut">
               <a:rPr lang="en-US" smtClean="0"/>
-              <a:t>11/30/19</a:t>
+              <a:t>12/3/19</a:t>
             </a:fld>
             <a:endParaRPr lang="en-US"/>
           </a:p>
@@ -2203,7 +2203,7 @@
           <a:p>
             <a:fld id="{FD2F1D65-88FA-B345-95F8-A8FCF199D2AD}" type="datetimeFigureOut">
               <a:rPr lang="en-US" smtClean="0"/>
-              <a:t>11/30/19</a:t>
+              <a:t>12/3/19</a:t>
             </a:fld>
             <a:endParaRPr lang="en-US"/>
           </a:p>
@@ -2298,7 +2298,7 @@
           <a:p>
             <a:fld id="{FD2F1D65-88FA-B345-95F8-A8FCF199D2AD}" type="datetimeFigureOut">
               <a:rPr lang="en-US" smtClean="0"/>
-              <a:t>11/30/19</a:t>
+              <a:t>12/3/19</a:t>
             </a:fld>
             <a:endParaRPr lang="en-US"/>
           </a:p>
@@ -2575,7 +2575,7 @@
           <a:p>
             <a:fld id="{FD2F1D65-88FA-B345-95F8-A8FCF199D2AD}" type="datetimeFigureOut">
               <a:rPr lang="en-US" smtClean="0"/>
-              <a:t>11/30/19</a:t>
+              <a:t>12/3/19</a:t>
             </a:fld>
             <a:endParaRPr lang="en-US"/>
           </a:p>
@@ -2832,7 +2832,7 @@
           <a:p>
             <a:fld id="{FD2F1D65-88FA-B345-95F8-A8FCF199D2AD}" type="datetimeFigureOut">
               <a:rPr lang="en-US" smtClean="0"/>
-              <a:t>11/30/19</a:t>
+              <a:t>12/3/19</a:t>
             </a:fld>
             <a:endParaRPr lang="en-US"/>
           </a:p>
@@ -3002,7 +3002,7 @@
           <a:p>
             <a:fld id="{FD2F1D65-88FA-B345-95F8-A8FCF199D2AD}" type="datetimeFigureOut">
               <a:rPr lang="en-US" smtClean="0"/>
-              <a:t>11/30/19</a:t>
+              <a:t>12/3/19</a:t>
             </a:fld>
             <a:endParaRPr lang="en-US"/>
           </a:p>
@@ -3182,7 +3182,7 @@
           <a:p>
             <a:fld id="{FD2F1D65-88FA-B345-95F8-A8FCF199D2AD}" type="datetimeFigureOut">
               <a:rPr lang="en-US" smtClean="0"/>
-              <a:t>11/30/19</a:t>
+              <a:t>12/3/19</a:t>
             </a:fld>
             <a:endParaRPr lang="en-US"/>
           </a:p>
@@ -8399,7 +8399,7 @@
           <a:p>
             <a:fld id="{FD2F1D65-88FA-B345-95F8-A8FCF199D2AD}" type="datetimeFigureOut">
               <a:rPr lang="en-US" smtClean="0"/>
-              <a:t>11/30/19</a:t>
+              <a:t>12/3/19</a:t>
             </a:fld>
             <a:endParaRPr lang="en-US"/>
           </a:p>
@@ -8569,7 +8569,7 @@
           <a:p>
             <a:fld id="{FD2F1D65-88FA-B345-95F8-A8FCF199D2AD}" type="datetimeFigureOut">
               <a:rPr lang="en-US" smtClean="0"/>
-              <a:t>11/30/19</a:t>
+              <a:t>12/3/19</a:t>
             </a:fld>
             <a:endParaRPr lang="en-US"/>
           </a:p>
@@ -8813,7 +8813,7 @@
           <a:p>
             <a:fld id="{FD2F1D65-88FA-B345-95F8-A8FCF199D2AD}" type="datetimeFigureOut">
               <a:rPr lang="en-US" smtClean="0"/>
-              <a:t>11/30/19</a:t>
+              <a:t>12/3/19</a:t>
             </a:fld>
             <a:endParaRPr lang="en-US"/>
           </a:p>
@@ -9045,7 +9045,7 @@
           <a:p>
             <a:fld id="{FD2F1D65-88FA-B345-95F8-A8FCF199D2AD}" type="datetimeFigureOut">
               <a:rPr lang="en-US" smtClean="0"/>
-              <a:t>11/30/19</a:t>
+              <a:t>12/3/19</a:t>
             </a:fld>
             <a:endParaRPr lang="en-US"/>
           </a:p>
@@ -13007,7 +13007,7 @@
           <a:p>
             <a:fld id="{C764DE79-268F-4C1A-8933-263129D2AF90}" type="datetimeFigureOut">
               <a:rPr lang="en-US" dirty="0"/>
-              <a:t>11/30/19</a:t>
+              <a:t>12/3/19</a:t>
             </a:fld>
             <a:endParaRPr lang="en-US" dirty="0"/>
           </a:p>
@@ -16444,8 +16444,8 @@
           <a:chExt cx="0" cy="0"/>
         </a:xfrm>
       </p:grpSpPr>
-      <mc:AlternateContent xmlns:mc="http://schemas.openxmlformats.org/markup-compatibility/2006">
-        <mc:Choice xmlns:a14="http://schemas.microsoft.com/office/drawing/2010/main" Requires="a14">
+      <mc:AlternateContent xmlns:mc="http://schemas.openxmlformats.org/markup-compatibility/2006" xmlns:a14="http://schemas.microsoft.com/office/drawing/2010/main">
+        <mc:Choice Requires="a14">
           <p:sp>
             <p:nvSpPr>
               <p:cNvPr id="87" name="Text Placeholder 86">
@@ -16961,7 +16961,7 @@
             </p:txBody>
           </p:sp>
         </mc:Choice>
-        <mc:Fallback>
+        <mc:Fallback xmlns="">
           <p:sp>
             <p:nvSpPr>
               <p:cNvPr id="87" name="Text Placeholder 86">
@@ -17114,8 +17114,8 @@
           </a:p>
         </p:txBody>
       </p:sp>
-      <mc:AlternateContent xmlns:mc="http://schemas.openxmlformats.org/markup-compatibility/2006">
-        <mc:Choice xmlns:a14="http://schemas.microsoft.com/office/drawing/2010/main" Requires="a14">
+      <mc:AlternateContent xmlns:mc="http://schemas.openxmlformats.org/markup-compatibility/2006" xmlns:a14="http://schemas.microsoft.com/office/drawing/2010/main">
+        <mc:Choice Requires="a14">
           <p:sp>
             <p:nvSpPr>
               <p:cNvPr id="90" name="Text Placeholder 89">
@@ -17554,7 +17554,7 @@
             </p:txBody>
           </p:sp>
         </mc:Choice>
-        <mc:Fallback>
+        <mc:Fallback xmlns="">
           <p:sp>
             <p:nvSpPr>
               <p:cNvPr id="90" name="Text Placeholder 89">
@@ -17699,54 +17699,122 @@
           </a:p>
         </p:txBody>
       </p:sp>
-      <p:sp>
-        <p:nvSpPr>
-          <p:cNvPr id="95" name="Text Placeholder 94">
-            <a:extLst>
-              <a:ext uri="{FF2B5EF4-FFF2-40B4-BE49-F238E27FC236}">
-                <a16:creationId xmlns:a16="http://schemas.microsoft.com/office/drawing/2014/main" id="{C425D03E-96C1-804B-9990-78B2B8349537}"/>
-              </a:ext>
-            </a:extLst>
-          </p:cNvPr>
-          <p:cNvSpPr>
-            <a:spLocks noGrp="1"/>
-          </p:cNvSpPr>
-          <p:nvPr>
-            <p:ph type="body" sz="quarter" idx="26"/>
-          </p:nvPr>
-        </p:nvSpPr>
-        <p:spPr>
-          <a:xfrm>
-            <a:off x="33390292" y="6378481"/>
-            <a:ext cx="10047018" cy="1304309"/>
-          </a:xfrm>
-          <a:solidFill>
-            <a:srgbClr val="EAEAEA"/>
-          </a:solidFill>
-          <a:ln>
-            <a:solidFill>
-              <a:schemeClr val="accent4">
-                <a:lumMod val="50000"/>
-              </a:schemeClr>
-            </a:solidFill>
-          </a:ln>
-        </p:spPr>
-        <p:txBody>
-          <a:bodyPr/>
-          <a:lstStyle/>
-          <a:p>
-            <a:pPr>
-              <a:lnSpc>
-                <a:spcPct val="114000"/>
-              </a:lnSpc>
-            </a:pPr>
-            <a:r>
-              <a:rPr lang="en-US" dirty="0"/>
-              <a:t>As the external driving force is varied, period doubling behavior progressively arises until the system eventually becomes chaotic.</a:t>
-            </a:r>
-          </a:p>
-        </p:txBody>
-      </p:sp>
+      <mc:AlternateContent xmlns:mc="http://schemas.openxmlformats.org/markup-compatibility/2006">
+        <mc:Choice xmlns:a14="http://schemas.microsoft.com/office/drawing/2010/main" Requires="a14">
+          <p:sp>
+            <p:nvSpPr>
+              <p:cNvPr id="95" name="Text Placeholder 94">
+                <a:extLst>
+                  <a:ext uri="{FF2B5EF4-FFF2-40B4-BE49-F238E27FC236}">
+                    <a16:creationId xmlns:a16="http://schemas.microsoft.com/office/drawing/2014/main" id="{C425D03E-96C1-804B-9990-78B2B8349537}"/>
+                  </a:ext>
+                </a:extLst>
+              </p:cNvPr>
+              <p:cNvSpPr>
+                <a:spLocks noGrp="1"/>
+              </p:cNvSpPr>
+              <p:nvPr>
+                <p:ph type="body" sz="quarter" idx="26"/>
+              </p:nvPr>
+            </p:nvSpPr>
+            <p:spPr>
+              <a:xfrm>
+                <a:off x="33390292" y="6378482"/>
+                <a:ext cx="10047018" cy="1590498"/>
+              </a:xfrm>
+              <a:solidFill>
+                <a:srgbClr val="EAEAEA"/>
+              </a:solidFill>
+              <a:ln>
+                <a:solidFill>
+                  <a:schemeClr val="accent4">
+                    <a:lumMod val="50000"/>
+                  </a:schemeClr>
+                </a:solidFill>
+              </a:ln>
+            </p:spPr>
+            <p:txBody>
+              <a:bodyPr/>
+              <a:lstStyle/>
+              <a:p>
+                <a:pPr>
+                  <a:lnSpc>
+                    <a:spcPct val="114000"/>
+                  </a:lnSpc>
+                </a:pPr>
+                <a:r>
+                  <a:rPr lang="en-US" dirty="0"/>
+                  <a:t>As the external driving force is varied, period doubling behavior progressively arises until the system eventually becomes chaotic. The simulation was run over 400,000 iterations for 350 values of </a:t>
+                </a:r>
+                <a14:m>
+                  <m:oMath xmlns:m="http://schemas.openxmlformats.org/officeDocument/2006/math">
+                    <m:r>
+                      <a:rPr lang="en-US" b="0" i="1" smtClean="0">
+                        <a:latin typeface="Cambria Math" panose="02040503050406030204" pitchFamily="18" charset="0"/>
+                      </a:rPr>
+                      <m:t>𝜂</m:t>
+                    </m:r>
+                  </m:oMath>
+                </a14:m>
+                <a:r>
+                  <a:rPr lang="en-US" dirty="0"/>
+                  <a:t>.</a:t>
+                </a:r>
+              </a:p>
+            </p:txBody>
+          </p:sp>
+        </mc:Choice>
+        <mc:Fallback>
+          <p:sp>
+            <p:nvSpPr>
+              <p:cNvPr id="95" name="Text Placeholder 94">
+                <a:extLst>
+                  <a:ext uri="{FF2B5EF4-FFF2-40B4-BE49-F238E27FC236}">
+                    <a16:creationId xmlns:a16="http://schemas.microsoft.com/office/drawing/2014/main" id="{C425D03E-96C1-804B-9990-78B2B8349537}"/>
+                  </a:ext>
+                </a:extLst>
+              </p:cNvPr>
+              <p:cNvSpPr>
+                <a:spLocks noGrp="1" noRot="1" noChangeAspect="1" noMove="1" noResize="1" noEditPoints="1" noAdjustHandles="1" noChangeArrowheads="1" noChangeShapeType="1" noTextEdit="1"/>
+              </p:cNvSpPr>
+              <p:nvPr>
+                <p:ph type="body" sz="quarter" idx="26"/>
+              </p:nvPr>
+            </p:nvSpPr>
+            <p:spPr>
+              <a:xfrm>
+                <a:off x="33390292" y="6378482"/>
+                <a:ext cx="10047018" cy="1590498"/>
+              </a:xfrm>
+              <a:blipFill>
+                <a:blip r:embed="rId5"/>
+                <a:stretch>
+                  <a:fillRect b="-5512"/>
+                </a:stretch>
+              </a:blipFill>
+              <a:ln>
+                <a:solidFill>
+                  <a:schemeClr val="accent4">
+                    <a:lumMod val="50000"/>
+                  </a:schemeClr>
+                </a:solidFill>
+              </a:ln>
+            </p:spPr>
+            <p:txBody>
+              <a:bodyPr/>
+              <a:lstStyle/>
+              <a:p>
+                <a:r>
+                  <a:rPr lang="en-US">
+                    <a:noFill/>
+                  </a:rPr>
+                  <a:t> </a:t>
+                </a:r>
+              </a:p>
+            </p:txBody>
+          </p:sp>
+        </mc:Fallback>
+      </mc:AlternateContent>
       <p:sp>
         <p:nvSpPr>
           <p:cNvPr id="96" name="Text Placeholder 95">
@@ -18060,7 +18128,7 @@
             </a:r>
             <a:r>
               <a:rPr lang="en-US" dirty="0">
-                <a:hlinkClick r:id="rId5"/>
+                <a:hlinkClick r:id="rId6"/>
               </a:rPr>
               <a:t>lbaralt@uchicago.edu</a:t>
             </a:r>
@@ -18070,7 +18138,7 @@
             </a:r>
             <a:r>
               <a:rPr lang="en-US" dirty="0">
-                <a:hlinkClick r:id="rId6"/>
+                <a:hlinkClick r:id="rId7"/>
               </a:rPr>
               <a:t>https://github.com/lubar13/Final-Project-Equation-of-Pendulum</a:t>
             </a:r>
@@ -18091,8 +18159,8 @@
           </a:p>
         </p:txBody>
       </p:sp>
-      <mc:AlternateContent xmlns:mc="http://schemas.openxmlformats.org/markup-compatibility/2006">
-        <mc:Choice xmlns:a14="http://schemas.microsoft.com/office/drawing/2010/main" Requires="a14">
+      <mc:AlternateContent xmlns:mc="http://schemas.openxmlformats.org/markup-compatibility/2006" xmlns:a14="http://schemas.microsoft.com/office/drawing/2010/main">
+        <mc:Choice Requires="a14">
           <p:sp>
             <p:nvSpPr>
               <p:cNvPr id="100" name="Text Placeholder 99">
@@ -19248,7 +19316,7 @@
             </p:txBody>
           </p:sp>
         </mc:Choice>
-        <mc:Fallback>
+        <mc:Fallback xmlns="">
           <p:sp>
             <p:nvSpPr>
               <p:cNvPr id="100" name="Text Placeholder 99">
@@ -19271,7 +19339,7 @@
                 <a:ext cx="10056813" cy="16838969"/>
               </a:xfrm>
               <a:blipFill>
-                <a:blip r:embed="rId7"/>
+                <a:blip r:embed="rId8"/>
                 <a:stretch>
                   <a:fillRect/>
                 </a:stretch>
@@ -19614,8 +19682,8 @@
           </a:p>
         </p:txBody>
       </p:sp>
-      <mc:AlternateContent xmlns:mc="http://schemas.openxmlformats.org/markup-compatibility/2006">
-        <mc:Choice xmlns:a14="http://schemas.microsoft.com/office/drawing/2010/main" Requires="a14">
+      <mc:AlternateContent xmlns:mc="http://schemas.openxmlformats.org/markup-compatibility/2006" xmlns:a14="http://schemas.microsoft.com/office/drawing/2010/main">
+        <mc:Choice Requires="a14">
           <p:sp>
             <p:nvSpPr>
               <p:cNvPr id="37" name="Text Placeholder 89">
@@ -19888,7 +19956,7 @@
             </p:txBody>
           </p:sp>
         </mc:Choice>
-        <mc:Fallback>
+        <mc:Fallback xmlns="">
           <p:sp>
             <p:nvSpPr>
               <p:cNvPr id="37" name="Text Placeholder 89">
@@ -19912,7 +19980,7 @@
                 <a:avLst/>
               </a:prstGeom>
               <a:blipFill>
-                <a:blip r:embed="rId8"/>
+                <a:blip r:embed="rId9"/>
                 <a:stretch>
                   <a:fillRect/>
                 </a:stretch>
@@ -19955,7 +20023,7 @@
           <p:nvPr/>
         </p:nvPicPr>
         <p:blipFill>
-          <a:blip r:embed="rId9">
+          <a:blip r:embed="rId10">
             <a:extLst>
               <a:ext uri="{28A0092B-C50C-407E-A947-70E740481C1C}">
                 <a14:useLocalDpi xmlns:a14="http://schemas.microsoft.com/office/drawing/2010/main" val="0"/>
@@ -20440,8 +20508,8 @@
           </a:p>
         </p:txBody>
       </p:sp>
-      <mc:AlternateContent xmlns:mc="http://schemas.openxmlformats.org/markup-compatibility/2006">
-        <mc:Choice xmlns:a14="http://schemas.microsoft.com/office/drawing/2010/main" Requires="a14">
+      <mc:AlternateContent xmlns:mc="http://schemas.openxmlformats.org/markup-compatibility/2006" xmlns:a14="http://schemas.microsoft.com/office/drawing/2010/main">
+        <mc:Choice Requires="a14">
           <p:sp>
             <p:nvSpPr>
               <p:cNvPr id="59" name="Text Placeholder 89">
@@ -20705,7 +20773,7 @@
             </p:txBody>
           </p:sp>
         </mc:Choice>
-        <mc:Fallback>
+        <mc:Fallback xmlns="">
           <p:sp>
             <p:nvSpPr>
               <p:cNvPr id="59" name="Text Placeholder 89">
@@ -20729,7 +20797,7 @@
                 <a:avLst/>
               </a:prstGeom>
               <a:blipFill>
-                <a:blip r:embed="rId10"/>
+                <a:blip r:embed="rId11"/>
                 <a:stretch>
                   <a:fillRect/>
                 </a:stretch>
@@ -20972,8 +21040,8 @@
           </a:p>
         </p:txBody>
       </p:sp>
-      <mc:AlternateContent xmlns:mc="http://schemas.openxmlformats.org/markup-compatibility/2006">
-        <mc:Choice xmlns:a14="http://schemas.microsoft.com/office/drawing/2010/main" Requires="a14">
+      <mc:AlternateContent xmlns:mc="http://schemas.openxmlformats.org/markup-compatibility/2006" xmlns:a14="http://schemas.microsoft.com/office/drawing/2010/main">
+        <mc:Choice Requires="a14">
           <p:sp>
             <p:nvSpPr>
               <p:cNvPr id="76" name="TextBox 75">
@@ -21133,7 +21201,7 @@
             </p:txBody>
           </p:sp>
         </mc:Choice>
-        <mc:Fallback>
+        <mc:Fallback xmlns="">
           <p:sp>
             <p:nvSpPr>
               <p:cNvPr id="76" name="TextBox 75">
@@ -21157,7 +21225,7 @@
                 <a:avLst/>
               </a:prstGeom>
               <a:blipFill>
-                <a:blip r:embed="rId11"/>
+                <a:blip r:embed="rId12"/>
                 <a:stretch>
                   <a:fillRect l="-1280" t="-2459" r="-1536" b="-9836"/>
                 </a:stretch>
@@ -21263,7 +21331,7 @@
           <p:nvPr/>
         </p:nvPicPr>
         <p:blipFill>
-          <a:blip r:embed="rId12">
+          <a:blip r:embed="rId13">
             <a:extLst>
               <a:ext uri="{28A0092B-C50C-407E-A947-70E740481C1C}">
                 <a14:useLocalDpi xmlns:a14="http://schemas.microsoft.com/office/drawing/2010/main" val="0"/>
@@ -21306,7 +21374,7 @@
           <p:nvPr/>
         </p:nvPicPr>
         <p:blipFill>
-          <a:blip r:embed="rId13">
+          <a:blip r:embed="rId14">
             <a:extLst>
               <a:ext uri="{28A0092B-C50C-407E-A947-70E740481C1C}">
                 <a14:useLocalDpi xmlns:a14="http://schemas.microsoft.com/office/drawing/2010/main" val="0"/>
@@ -21349,7 +21417,7 @@
           <p:nvPr/>
         </p:nvPicPr>
         <p:blipFill>
-          <a:blip r:embed="rId14">
+          <a:blip r:embed="rId15">
             <a:extLst>
               <a:ext uri="{28A0092B-C50C-407E-A947-70E740481C1C}">
                 <a14:useLocalDpi xmlns:a14="http://schemas.microsoft.com/office/drawing/2010/main" val="0"/>
@@ -21391,7 +21459,7 @@
           <p:nvPr/>
         </p:nvPicPr>
         <p:blipFill>
-          <a:blip r:embed="rId15">
+          <a:blip r:embed="rId16">
             <a:extLst>
               <a:ext uri="{28A0092B-C50C-407E-A947-70E740481C1C}">
                 <a14:useLocalDpi xmlns:a14="http://schemas.microsoft.com/office/drawing/2010/main" val="0"/>
@@ -21433,7 +21501,7 @@
           <p:nvPr/>
         </p:nvPicPr>
         <p:blipFill>
-          <a:blip r:embed="rId16">
+          <a:blip r:embed="rId17">
             <a:extLst>
               <a:ext uri="{28A0092B-C50C-407E-A947-70E740481C1C}">
                 <a14:useLocalDpi xmlns:a14="http://schemas.microsoft.com/office/drawing/2010/main" val="0"/>
@@ -21469,7 +21537,7 @@
           <p:nvPr/>
         </p:nvPicPr>
         <p:blipFill>
-          <a:blip r:embed="rId17">
+          <a:blip r:embed="rId18">
             <a:extLst>
               <a:ext uri="{28A0092B-C50C-407E-A947-70E740481C1C}">
                 <a14:useLocalDpi xmlns:a14="http://schemas.microsoft.com/office/drawing/2010/main" val="0"/>
@@ -21505,7 +21573,7 @@
           <p:nvPr/>
         </p:nvPicPr>
         <p:blipFill>
-          <a:blip r:embed="rId18">
+          <a:blip r:embed="rId19">
             <a:extLst>
               <a:ext uri="{28A0092B-C50C-407E-A947-70E740481C1C}">
                 <a14:useLocalDpi xmlns:a14="http://schemas.microsoft.com/office/drawing/2010/main" val="0"/>
@@ -21517,7 +21585,7 @@
         </p:blipFill>
         <p:spPr>
           <a:xfrm>
-            <a:off x="34490094" y="7994476"/>
+            <a:off x="34490094" y="8225529"/>
             <a:ext cx="7847414" cy="5885561"/>
           </a:xfrm>
           <a:prstGeom prst="rect">

</xml_diff>